<commit_message>
Fixes from our talk
</commit_message>
<xml_diff>
--- a/count_min_sketch_talk_EW.pptx
+++ b/count_min_sketch_talk_EW.pptx
@@ -5,7 +5,7 @@
     <p:sldMasterId id="2147483660" r:id="rId1"/>
   </p:sldMasterIdLst>
   <p:notesMasterIdLst>
-    <p:notesMasterId r:id="rId50"/>
+    <p:notesMasterId r:id="rId51"/>
   </p:notesMasterIdLst>
   <p:sldIdLst>
     <p:sldId id="256" r:id="rId2"/>
@@ -56,6 +56,7 @@
     <p:sldId id="291" r:id="rId47"/>
     <p:sldId id="292" r:id="rId48"/>
     <p:sldId id="293" r:id="rId49"/>
+    <p:sldId id="312" r:id="rId50"/>
   </p:sldIdLst>
   <p:sldSz cx="12192000" cy="6858000"/>
   <p:notesSz cx="6858000" cy="9144000"/>
@@ -808,6 +809,102 @@
           <a:bodyPr/>
           <a:lstStyle/>
           <a:p>
+            <a:r>
+              <a:rPr lang="en-US" dirty="0" smtClean="0"/>
+              <a:t>each</a:t>
+            </a:r>
+            <a:r>
+              <a:rPr lang="en-US" baseline="0" dirty="0" smtClean="0"/>
+              <a:t> row is a single </a:t>
+            </a:r>
+            <a:r>
+              <a:rPr lang="en-US" dirty="0" smtClean="0"/>
+              <a:t>estimators</a:t>
+            </a:r>
+            <a:endParaRPr lang="en-US" dirty="0"/>
+          </a:p>
+        </p:txBody>
+      </p:sp>
+      <p:sp>
+        <p:nvSpPr>
+          <p:cNvPr id="4" name="Slide Number Placeholder 3"/>
+          <p:cNvSpPr>
+            <a:spLocks noGrp="1"/>
+          </p:cNvSpPr>
+          <p:nvPr>
+            <p:ph type="sldNum" sz="quarter" idx="10"/>
+          </p:nvPr>
+        </p:nvSpPr>
+        <p:spPr/>
+        <p:txBody>
+          <a:bodyPr/>
+          <a:lstStyle/>
+          <a:p>
+            <a:fld id="{C0B0A62E-9372-6E43-814B-0B1F17E56B7A}" type="slidenum">
+              <a:rPr lang="en-US" smtClean="0"/>
+              <a:t>12</a:t>
+            </a:fld>
+            <a:endParaRPr lang="en-US"/>
+          </a:p>
+        </p:txBody>
+      </p:sp>
+    </p:spTree>
+    <p:extLst>
+      <p:ext uri="{BB962C8B-B14F-4D97-AF65-F5344CB8AC3E}">
+        <p14:creationId xmlns:p14="http://schemas.microsoft.com/office/powerpoint/2010/main" val="501417930"/>
+      </p:ext>
+    </p:extLst>
+  </p:cSld>
+  <p:clrMapOvr>
+    <a:masterClrMapping/>
+  </p:clrMapOvr>
+</p:notes>
+</file>
+
+<file path=ppt/notesSlides/notesSlide5.xml><?xml version="1.0" encoding="utf-8"?>
+<p:notes xmlns:a="http://schemas.openxmlformats.org/drawingml/2006/main" xmlns:r="http://schemas.openxmlformats.org/officeDocument/2006/relationships" xmlns:p="http://schemas.openxmlformats.org/presentationml/2006/main">
+  <p:cSld>
+    <p:spTree>
+      <p:nvGrpSpPr>
+        <p:cNvPr id="1" name=""/>
+        <p:cNvGrpSpPr/>
+        <p:nvPr/>
+      </p:nvGrpSpPr>
+      <p:grpSpPr>
+        <a:xfrm>
+          <a:off x="0" y="0"/>
+          <a:ext cx="0" cy="0"/>
+          <a:chOff x="0" y="0"/>
+          <a:chExt cx="0" cy="0"/>
+        </a:xfrm>
+      </p:grpSpPr>
+      <p:sp>
+        <p:nvSpPr>
+          <p:cNvPr id="2" name="Slide Image Placeholder 1"/>
+          <p:cNvSpPr>
+            <a:spLocks noGrp="1" noRot="1" noChangeAspect="1"/>
+          </p:cNvSpPr>
+          <p:nvPr>
+            <p:ph type="sldImg"/>
+          </p:nvPr>
+        </p:nvSpPr>
+        <p:spPr/>
+      </p:sp>
+      <p:sp>
+        <p:nvSpPr>
+          <p:cNvPr id="3" name="Notes Placeholder 2"/>
+          <p:cNvSpPr>
+            <a:spLocks noGrp="1"/>
+          </p:cNvSpPr>
+          <p:nvPr>
+            <p:ph type="body" idx="1"/>
+          </p:nvPr>
+        </p:nvSpPr>
+        <p:spPr/>
+        <p:txBody>
+          <a:bodyPr/>
+          <a:lstStyle/>
+          <a:p>
             <a:endParaRPr lang="en-US" dirty="0"/>
           </a:p>
         </p:txBody>
@@ -839,6 +936,396 @@
     <p:extLst>
       <p:ext uri="{BB962C8B-B14F-4D97-AF65-F5344CB8AC3E}">
         <p14:creationId xmlns:p14="http://schemas.microsoft.com/office/powerpoint/2010/main" val="1958859206"/>
+      </p:ext>
+    </p:extLst>
+  </p:cSld>
+  <p:clrMapOvr>
+    <a:masterClrMapping/>
+  </p:clrMapOvr>
+</p:notes>
+</file>
+
+<file path=ppt/notesSlides/notesSlide6.xml><?xml version="1.0" encoding="utf-8"?>
+<p:notes xmlns:a="http://schemas.openxmlformats.org/drawingml/2006/main" xmlns:r="http://schemas.openxmlformats.org/officeDocument/2006/relationships" xmlns:p="http://schemas.openxmlformats.org/presentationml/2006/main">
+  <p:cSld>
+    <p:spTree>
+      <p:nvGrpSpPr>
+        <p:cNvPr id="1" name=""/>
+        <p:cNvGrpSpPr/>
+        <p:nvPr/>
+      </p:nvGrpSpPr>
+      <p:grpSpPr>
+        <a:xfrm>
+          <a:off x="0" y="0"/>
+          <a:ext cx="0" cy="0"/>
+          <a:chOff x="0" y="0"/>
+          <a:chExt cx="0" cy="0"/>
+        </a:xfrm>
+      </p:grpSpPr>
+      <p:sp>
+        <p:nvSpPr>
+          <p:cNvPr id="2" name="Slide Image Placeholder 1"/>
+          <p:cNvSpPr>
+            <a:spLocks noGrp="1" noRot="1" noChangeAspect="1"/>
+          </p:cNvSpPr>
+          <p:nvPr>
+            <p:ph type="sldImg"/>
+          </p:nvPr>
+        </p:nvSpPr>
+        <p:spPr/>
+      </p:sp>
+      <p:sp>
+        <p:nvSpPr>
+          <p:cNvPr id="3" name="Notes Placeholder 2"/>
+          <p:cNvSpPr>
+            <a:spLocks noGrp="1"/>
+          </p:cNvSpPr>
+          <p:nvPr>
+            <p:ph type="body" idx="1"/>
+          </p:nvPr>
+        </p:nvSpPr>
+        <p:spPr/>
+        <p:txBody>
+          <a:bodyPr/>
+          <a:lstStyle/>
+          <a:p>
+            <a:endParaRPr lang="en-US" dirty="0"/>
+          </a:p>
+        </p:txBody>
+      </p:sp>
+      <p:sp>
+        <p:nvSpPr>
+          <p:cNvPr id="4" name="Slide Number Placeholder 3"/>
+          <p:cNvSpPr>
+            <a:spLocks noGrp="1"/>
+          </p:cNvSpPr>
+          <p:nvPr>
+            <p:ph type="sldNum" sz="quarter" idx="10"/>
+          </p:nvPr>
+        </p:nvSpPr>
+        <p:spPr/>
+        <p:txBody>
+          <a:bodyPr/>
+          <a:lstStyle/>
+          <a:p>
+            <a:fld id="{C0B0A62E-9372-6E43-814B-0B1F17E56B7A}" type="slidenum">
+              <a:rPr lang="en-US" smtClean="0"/>
+              <a:t>14</a:t>
+            </a:fld>
+            <a:endParaRPr lang="en-US"/>
+          </a:p>
+        </p:txBody>
+      </p:sp>
+    </p:spTree>
+    <p:extLst>
+      <p:ext uri="{BB962C8B-B14F-4D97-AF65-F5344CB8AC3E}">
+        <p14:creationId xmlns:p14="http://schemas.microsoft.com/office/powerpoint/2010/main" val="475207368"/>
+      </p:ext>
+    </p:extLst>
+  </p:cSld>
+  <p:clrMapOvr>
+    <a:masterClrMapping/>
+  </p:clrMapOvr>
+</p:notes>
+</file>
+
+<file path=ppt/notesSlides/notesSlide7.xml><?xml version="1.0" encoding="utf-8"?>
+<p:notes xmlns:a="http://schemas.openxmlformats.org/drawingml/2006/main" xmlns:r="http://schemas.openxmlformats.org/officeDocument/2006/relationships" xmlns:p="http://schemas.openxmlformats.org/presentationml/2006/main">
+  <p:cSld>
+    <p:spTree>
+      <p:nvGrpSpPr>
+        <p:cNvPr id="1" name=""/>
+        <p:cNvGrpSpPr/>
+        <p:nvPr/>
+      </p:nvGrpSpPr>
+      <p:grpSpPr>
+        <a:xfrm>
+          <a:off x="0" y="0"/>
+          <a:ext cx="0" cy="0"/>
+          <a:chOff x="0" y="0"/>
+          <a:chExt cx="0" cy="0"/>
+        </a:xfrm>
+      </p:grpSpPr>
+      <p:sp>
+        <p:nvSpPr>
+          <p:cNvPr id="2" name="Slide Image Placeholder 1"/>
+          <p:cNvSpPr>
+            <a:spLocks noGrp="1" noRot="1" noChangeAspect="1"/>
+          </p:cNvSpPr>
+          <p:nvPr>
+            <p:ph type="sldImg"/>
+          </p:nvPr>
+        </p:nvSpPr>
+        <p:spPr/>
+      </p:sp>
+      <p:sp>
+        <p:nvSpPr>
+          <p:cNvPr id="3" name="Notes Placeholder 2"/>
+          <p:cNvSpPr>
+            <a:spLocks noGrp="1"/>
+          </p:cNvSpPr>
+          <p:nvPr>
+            <p:ph type="body" idx="1"/>
+          </p:nvPr>
+        </p:nvSpPr>
+        <p:spPr/>
+        <p:txBody>
+          <a:bodyPr/>
+          <a:lstStyle/>
+          <a:p>
+            <a:r>
+              <a:rPr lang="en-US" dirty="0" smtClean="0"/>
+              <a:t>lower bound on the estimate</a:t>
+            </a:r>
+            <a:endParaRPr lang="en-US" dirty="0"/>
+          </a:p>
+        </p:txBody>
+      </p:sp>
+      <p:sp>
+        <p:nvSpPr>
+          <p:cNvPr id="4" name="Slide Number Placeholder 3"/>
+          <p:cNvSpPr>
+            <a:spLocks noGrp="1"/>
+          </p:cNvSpPr>
+          <p:nvPr>
+            <p:ph type="sldNum" sz="quarter" idx="10"/>
+          </p:nvPr>
+        </p:nvSpPr>
+        <p:spPr/>
+        <p:txBody>
+          <a:bodyPr/>
+          <a:lstStyle/>
+          <a:p>
+            <a:fld id="{C0B0A62E-9372-6E43-814B-0B1F17E56B7A}" type="slidenum">
+              <a:rPr lang="en-US" smtClean="0"/>
+              <a:t>15</a:t>
+            </a:fld>
+            <a:endParaRPr lang="en-US"/>
+          </a:p>
+        </p:txBody>
+      </p:sp>
+    </p:spTree>
+    <p:extLst>
+      <p:ext uri="{BB962C8B-B14F-4D97-AF65-F5344CB8AC3E}">
+        <p14:creationId xmlns:p14="http://schemas.microsoft.com/office/powerpoint/2010/main" val="863038758"/>
+      </p:ext>
+    </p:extLst>
+  </p:cSld>
+  <p:clrMapOvr>
+    <a:masterClrMapping/>
+  </p:clrMapOvr>
+</p:notes>
+</file>
+
+<file path=ppt/notesSlides/notesSlide8.xml><?xml version="1.0" encoding="utf-8"?>
+<p:notes xmlns:a="http://schemas.openxmlformats.org/drawingml/2006/main" xmlns:r="http://schemas.openxmlformats.org/officeDocument/2006/relationships" xmlns:p="http://schemas.openxmlformats.org/presentationml/2006/main">
+  <p:cSld>
+    <p:spTree>
+      <p:nvGrpSpPr>
+        <p:cNvPr id="1" name=""/>
+        <p:cNvGrpSpPr/>
+        <p:nvPr/>
+      </p:nvGrpSpPr>
+      <p:grpSpPr>
+        <a:xfrm>
+          <a:off x="0" y="0"/>
+          <a:ext cx="0" cy="0"/>
+          <a:chOff x="0" y="0"/>
+          <a:chExt cx="0" cy="0"/>
+        </a:xfrm>
+      </p:grpSpPr>
+      <p:sp>
+        <p:nvSpPr>
+          <p:cNvPr id="2" name="Slide Image Placeholder 1"/>
+          <p:cNvSpPr>
+            <a:spLocks noGrp="1" noRot="1" noChangeAspect="1"/>
+          </p:cNvSpPr>
+          <p:nvPr>
+            <p:ph type="sldImg"/>
+          </p:nvPr>
+        </p:nvSpPr>
+        <p:spPr/>
+      </p:sp>
+      <p:sp>
+        <p:nvSpPr>
+          <p:cNvPr id="3" name="Notes Placeholder 2"/>
+          <p:cNvSpPr>
+            <a:spLocks noGrp="1"/>
+          </p:cNvSpPr>
+          <p:nvPr>
+            <p:ph type="body" idx="1"/>
+          </p:nvPr>
+        </p:nvSpPr>
+        <p:spPr/>
+        <p:txBody>
+          <a:bodyPr/>
+          <a:lstStyle/>
+          <a:p>
+            <a:r>
+              <a:rPr lang="en-US" dirty="0" smtClean="0"/>
+              <a:t>x(</a:t>
+            </a:r>
+            <a:r>
+              <a:rPr lang="en-US" dirty="0" err="1" smtClean="0"/>
+              <a:t>i</a:t>
+            </a:r>
+            <a:r>
+              <a:rPr lang="en-US" dirty="0" smtClean="0"/>
+              <a:t>, j) is the sum</a:t>
+            </a:r>
+            <a:r>
+              <a:rPr lang="en-US" baseline="0" dirty="0" smtClean="0"/>
+              <a:t> of the values that collide with </a:t>
+            </a:r>
+            <a:r>
+              <a:rPr lang="en-US" baseline="0" dirty="0" err="1" smtClean="0"/>
+              <a:t>i</a:t>
+            </a:r>
+            <a:r>
+              <a:rPr lang="en-US" baseline="0" dirty="0" smtClean="0"/>
+              <a:t> in row J</a:t>
+            </a:r>
+            <a:endParaRPr lang="en-US" dirty="0"/>
+          </a:p>
+        </p:txBody>
+      </p:sp>
+      <p:sp>
+        <p:nvSpPr>
+          <p:cNvPr id="4" name="Slide Number Placeholder 3"/>
+          <p:cNvSpPr>
+            <a:spLocks noGrp="1"/>
+          </p:cNvSpPr>
+          <p:nvPr>
+            <p:ph type="sldNum" sz="quarter" idx="10"/>
+          </p:nvPr>
+        </p:nvSpPr>
+        <p:spPr/>
+        <p:txBody>
+          <a:bodyPr/>
+          <a:lstStyle/>
+          <a:p>
+            <a:fld id="{C0B0A62E-9372-6E43-814B-0B1F17E56B7A}" type="slidenum">
+              <a:rPr lang="en-US" smtClean="0"/>
+              <a:t>16</a:t>
+            </a:fld>
+            <a:endParaRPr lang="en-US"/>
+          </a:p>
+        </p:txBody>
+      </p:sp>
+    </p:spTree>
+    <p:extLst>
+      <p:ext uri="{BB962C8B-B14F-4D97-AF65-F5344CB8AC3E}">
+        <p14:creationId xmlns:p14="http://schemas.microsoft.com/office/powerpoint/2010/main" val="536561836"/>
+      </p:ext>
+    </p:extLst>
+  </p:cSld>
+  <p:clrMapOvr>
+    <a:masterClrMapping/>
+  </p:clrMapOvr>
+</p:notes>
+</file>
+
+<file path=ppt/notesSlides/notesSlide9.xml><?xml version="1.0" encoding="utf-8"?>
+<p:notes xmlns:a="http://schemas.openxmlformats.org/drawingml/2006/main" xmlns:r="http://schemas.openxmlformats.org/officeDocument/2006/relationships" xmlns:p="http://schemas.openxmlformats.org/presentationml/2006/main">
+  <p:cSld>
+    <p:spTree>
+      <p:nvGrpSpPr>
+        <p:cNvPr id="1" name=""/>
+        <p:cNvGrpSpPr/>
+        <p:nvPr/>
+      </p:nvGrpSpPr>
+      <p:grpSpPr>
+        <a:xfrm>
+          <a:off x="0" y="0"/>
+          <a:ext cx="0" cy="0"/>
+          <a:chOff x="0" y="0"/>
+          <a:chExt cx="0" cy="0"/>
+        </a:xfrm>
+      </p:grpSpPr>
+      <p:sp>
+        <p:nvSpPr>
+          <p:cNvPr id="2" name="Slide Image Placeholder 1"/>
+          <p:cNvSpPr>
+            <a:spLocks noGrp="1" noRot="1" noChangeAspect="1"/>
+          </p:cNvSpPr>
+          <p:nvPr>
+            <p:ph type="sldImg"/>
+          </p:nvPr>
+        </p:nvSpPr>
+        <p:spPr/>
+      </p:sp>
+      <p:sp>
+        <p:nvSpPr>
+          <p:cNvPr id="3" name="Notes Placeholder 2"/>
+          <p:cNvSpPr>
+            <a:spLocks noGrp="1"/>
+          </p:cNvSpPr>
+          <p:nvPr>
+            <p:ph type="body" idx="1"/>
+          </p:nvPr>
+        </p:nvSpPr>
+        <p:spPr/>
+        <p:txBody>
+          <a:bodyPr/>
+          <a:lstStyle/>
+          <a:p>
+            <a:r>
+              <a:rPr lang="en-US" dirty="0" smtClean="0"/>
+              <a:t>x(</a:t>
+            </a:r>
+            <a:r>
+              <a:rPr lang="en-US" dirty="0" err="1" smtClean="0"/>
+              <a:t>i</a:t>
+            </a:r>
+            <a:r>
+              <a:rPr lang="en-US" dirty="0" smtClean="0"/>
+              <a:t>, j) is the sum</a:t>
+            </a:r>
+            <a:r>
+              <a:rPr lang="en-US" baseline="0" dirty="0" smtClean="0"/>
+              <a:t> of the values that collide with </a:t>
+            </a:r>
+            <a:r>
+              <a:rPr lang="en-US" baseline="0" dirty="0" err="1" smtClean="0"/>
+              <a:t>i</a:t>
+            </a:r>
+            <a:r>
+              <a:rPr lang="en-US" baseline="0" dirty="0" smtClean="0"/>
+              <a:t> in row J</a:t>
+            </a:r>
+          </a:p>
+          <a:p>
+            <a:endParaRPr lang="en-US" baseline="0" dirty="0" smtClean="0"/>
+          </a:p>
+        </p:txBody>
+      </p:sp>
+      <p:sp>
+        <p:nvSpPr>
+          <p:cNvPr id="4" name="Slide Number Placeholder 3"/>
+          <p:cNvSpPr>
+            <a:spLocks noGrp="1"/>
+          </p:cNvSpPr>
+          <p:nvPr>
+            <p:ph type="sldNum" sz="quarter" idx="10"/>
+          </p:nvPr>
+        </p:nvSpPr>
+        <p:spPr/>
+        <p:txBody>
+          <a:bodyPr/>
+          <a:lstStyle/>
+          <a:p>
+            <a:fld id="{C0B0A62E-9372-6E43-814B-0B1F17E56B7A}" type="slidenum">
+              <a:rPr lang="en-US" smtClean="0"/>
+              <a:t>17</a:t>
+            </a:fld>
+            <a:endParaRPr lang="en-US"/>
+          </a:p>
+        </p:txBody>
+      </p:sp>
+    </p:spTree>
+    <p:extLst>
+      <p:ext uri="{BB962C8B-B14F-4D97-AF65-F5344CB8AC3E}">
+        <p14:creationId xmlns:p14="http://schemas.microsoft.com/office/powerpoint/2010/main" val="1222424323"/>
       </p:ext>
     </p:extLst>
   </p:cSld>
@@ -4560,6 +5047,10 @@
           <a:bodyPr/>
           <a:lstStyle/>
           <a:p>
+            <a:r>
+              <a:rPr lang="en-US" dirty="0"/>
+              <a:t>The Count-Min Sketch and Its Applications</a:t>
+            </a:r>
             <a:endParaRPr lang="en-US" dirty="0"/>
           </a:p>
         </p:txBody>
@@ -4576,9 +5067,53 @@
         </p:nvSpPr>
         <p:spPr/>
         <p:txBody>
-          <a:bodyPr/>
+          <a:bodyPr>
+            <a:normAutofit fontScale="85000" lnSpcReduction="20000"/>
+          </a:bodyPr>
           <a:lstStyle/>
           <a:p>
+            <a:r>
+              <a:rPr lang="en-US" dirty="0" smtClean="0"/>
+              <a:t>Graham </a:t>
+            </a:r>
+            <a:r>
+              <a:rPr lang="en-US" dirty="0" err="1" smtClean="0"/>
+              <a:t>Cormode</a:t>
+            </a:r>
+            <a:r>
+              <a:rPr lang="en-US" dirty="0" smtClean="0"/>
+              <a:t> and S. </a:t>
+            </a:r>
+            <a:r>
+              <a:rPr lang="en-US" dirty="0" err="1" smtClean="0"/>
+              <a:t>Muthukrishnan</a:t>
+            </a:r>
+            <a:endParaRPr lang="en-US" dirty="0" smtClean="0"/>
+          </a:p>
+          <a:p>
+            <a:endParaRPr lang="en-US" dirty="0"/>
+          </a:p>
+          <a:p>
+            <a:r>
+              <a:rPr lang="en-US" dirty="0" smtClean="0"/>
+              <a:t>Presented by Matthew </a:t>
+            </a:r>
+            <a:r>
+              <a:rPr lang="en-US" dirty="0" err="1" smtClean="0"/>
+              <a:t>ige</a:t>
+            </a:r>
+            <a:r>
+              <a:rPr lang="en-US" dirty="0" smtClean="0"/>
+              <a:t>, Ravi </a:t>
+            </a:r>
+            <a:r>
+              <a:rPr lang="en-US" dirty="0" err="1" smtClean="0"/>
+              <a:t>Gaddipati</a:t>
+            </a:r>
+            <a:r>
+              <a:rPr lang="en-US" dirty="0" smtClean="0"/>
+              <a:t>, and Emily Wagner</a:t>
+            </a:r>
             <a:endParaRPr lang="en-US" dirty="0"/>
           </a:p>
         </p:txBody>
@@ -7194,20 +7729,16 @@
               <a:buChar char="•"/>
             </a:pPr>
             <a:r>
+              <a:rPr lang="en-US" sz="2800" dirty="0">
+                <a:solidFill>
+                  <a:srgbClr val="0070C0"/>
+                </a:solidFill>
+              </a:rPr>
+              <a:t> </a:t>
+            </a:r>
+            <a:r>
               <a:rPr lang="en-US" sz="2800" dirty="0"/>
-              <a:t> </a:t>
-            </a:r>
-            <a:r>
-              <a:rPr lang="en-US" sz="2800" dirty="0" smtClean="0"/>
-              <a:t>Introduction</a:t>
-            </a:r>
-            <a:r>
-              <a:rPr lang="en-US" sz="2800" dirty="0"/>
-              <a:t>, Problem Statement, and Related </a:t>
-            </a:r>
-            <a:r>
-              <a:rPr lang="en-US" sz="2800" dirty="0" smtClean="0"/>
-              <a:t>Work</a:t>
+              <a:t>Introduction, Problem Statement, and Related Work</a:t>
             </a:r>
           </a:p>
           <a:p>
@@ -7216,8 +7747,16 @@
               <a:buChar char="•"/>
             </a:pPr>
             <a:r>
-              <a:rPr lang="en-US" sz="2800" dirty="0" smtClean="0"/>
-              <a:t> Count-Min Sketch construction and updates</a:t>
+              <a:rPr lang="en-US" sz="2800" dirty="0">
+                <a:solidFill>
+                  <a:srgbClr val="0070C0"/>
+                </a:solidFill>
+              </a:rPr>
+              <a:t> </a:t>
+            </a:r>
+            <a:r>
+              <a:rPr lang="en-US" sz="2800" dirty="0"/>
+              <a:t>Count-Min Sketch construction and updates</a:t>
             </a:r>
           </a:p>
           <a:p>
@@ -7226,16 +7765,12 @@
               <a:buChar char="•"/>
             </a:pPr>
             <a:r>
-              <a:rPr lang="en-US" sz="2800" dirty="0"/>
-              <a:t> </a:t>
-            </a:r>
-            <a:r>
-              <a:rPr lang="en-US" sz="2800" dirty="0" smtClean="0">
+              <a:rPr lang="en-US" sz="2800" dirty="0">
                 <a:solidFill>
                   <a:srgbClr val="0070C0"/>
                 </a:solidFill>
               </a:rPr>
-              <a:t>Point Queries: algorithm and bounds for the cash-register case</a:t>
+              <a:t> Point Queries: algorithm and bounds for the non-negative case</a:t>
             </a:r>
           </a:p>
           <a:p>
@@ -7245,13 +7780,8 @@
             </a:pPr>
             <a:r>
               <a:rPr lang="en-US" sz="2800" dirty="0"/>
-              <a:t> </a:t>
-            </a:r>
-            <a:r>
-              <a:rPr lang="en-US" sz="2800" dirty="0" smtClean="0"/>
-              <a:t>Inner Product Queries: algorithm and bounds</a:t>
-            </a:r>
-            <a:endParaRPr lang="en-US" sz="2800" dirty="0"/>
+              <a:t> Inner Product Queries: algorithm and bounds for the non-negative case</a:t>
+            </a:r>
           </a:p>
           <a:p>
             <a:pPr>
@@ -7260,26 +7790,9 @@
             </a:pPr>
             <a:r>
               <a:rPr lang="en-US" sz="2800" dirty="0"/>
-              <a:t> </a:t>
-            </a:r>
-            <a:r>
-              <a:rPr lang="en-US" sz="2800" dirty="0" smtClean="0"/>
-              <a:t>Range Queries: algorithm and bounds</a:t>
-            </a:r>
-          </a:p>
-          <a:p>
-            <a:pPr>
-              <a:buFont typeface="Arial" charset="0"/>
-              <a:buChar char="•"/>
-            </a:pPr>
-            <a:r>
-              <a:rPr lang="en-US" sz="2800" dirty="0"/>
-              <a:t> </a:t>
-            </a:r>
-            <a:r>
-              <a:rPr lang="en-US" sz="2800" dirty="0" smtClean="0"/>
-              <a:t>Selected Application: Heavy-Hitters</a:t>
-            </a:r>
+              <a:t> Range Queries: algorithm and bounds for the non-negative case</a:t>
+            </a:r>
+            <a:endParaRPr lang="en-US" sz="2800" dirty="0"/>
           </a:p>
         </p:txBody>
       </p:sp>
@@ -7352,7 +7865,7 @@
           <p:nvPr/>
         </p:nvPicPr>
         <p:blipFill>
-          <a:blip r:embed="rId2">
+          <a:blip r:embed="rId3">
             <a:extLst>
               <a:ext uri="{28A0092B-C50C-407E-A947-70E740481C1C}">
                 <a14:useLocalDpi xmlns:a14="http://schemas.microsoft.com/office/drawing/2010/main" val="0"/>
@@ -7382,7 +7895,7 @@
           <p:nvPr/>
         </p:nvPicPr>
         <p:blipFill>
-          <a:blip r:embed="rId3">
+          <a:blip r:embed="rId4">
             <a:extLst>
               <a:ext uri="{28A0092B-C50C-407E-A947-70E740481C1C}">
                 <a14:useLocalDpi xmlns:a14="http://schemas.microsoft.com/office/drawing/2010/main" val="0"/>
@@ -7412,7 +7925,7 @@
           <p:nvPr/>
         </p:nvPicPr>
         <p:blipFill>
-          <a:blip r:embed="rId4">
+          <a:blip r:embed="rId5">
             <a:extLst>
               <a:ext uri="{28A0092B-C50C-407E-A947-70E740481C1C}">
                 <a14:useLocalDpi xmlns:a14="http://schemas.microsoft.com/office/drawing/2010/main" val="0"/>
@@ -9856,7 +10369,7 @@
           <p:nvPr/>
         </p:nvPicPr>
         <p:blipFill>
-          <a:blip r:embed="rId2">
+          <a:blip r:embed="rId3">
             <a:extLst>
               <a:ext uri="{28A0092B-C50C-407E-A947-70E740481C1C}">
                 <a14:useLocalDpi xmlns:a14="http://schemas.microsoft.com/office/drawing/2010/main" val="0"/>
@@ -9886,7 +10399,7 @@
           <p:nvPr/>
         </p:nvPicPr>
         <p:blipFill>
-          <a:blip r:embed="rId3">
+          <a:blip r:embed="rId4">
             <a:extLst>
               <a:ext uri="{28A0092B-C50C-407E-A947-70E740481C1C}">
                 <a14:useLocalDpi xmlns:a14="http://schemas.microsoft.com/office/drawing/2010/main" val="0"/>
@@ -10021,7 +10534,7 @@
           <p:nvPr/>
         </p:nvPicPr>
         <p:blipFill>
-          <a:blip r:embed="rId2">
+          <a:blip r:embed="rId3">
             <a:extLst>
               <a:ext uri="{28A0092B-C50C-407E-A947-70E740481C1C}">
                 <a14:useLocalDpi xmlns:a14="http://schemas.microsoft.com/office/drawing/2010/main" val="0"/>
@@ -10074,7 +10587,7 @@
           <p:nvPr/>
         </p:nvPicPr>
         <p:blipFill>
-          <a:blip r:embed="rId3">
+          <a:blip r:embed="rId4">
             <a:extLst>
               <a:ext uri="{28A0092B-C50C-407E-A947-70E740481C1C}">
                 <a14:useLocalDpi xmlns:a14="http://schemas.microsoft.com/office/drawing/2010/main" val="0"/>
@@ -10110,7 +10623,7 @@
           <p:nvPr/>
         </p:nvPicPr>
         <p:blipFill>
-          <a:blip r:embed="rId4">
+          <a:blip r:embed="rId5">
             <a:extLst>
               <a:ext uri="{28A0092B-C50C-407E-A947-70E740481C1C}">
                 <a14:useLocalDpi xmlns:a14="http://schemas.microsoft.com/office/drawing/2010/main" val="0"/>
@@ -10140,7 +10653,7 @@
           <p:nvPr/>
         </p:nvPicPr>
         <p:blipFill>
-          <a:blip r:embed="rId5">
+          <a:blip r:embed="rId6">
             <a:extLst>
               <a:ext uri="{28A0092B-C50C-407E-A947-70E740481C1C}">
                 <a14:useLocalDpi xmlns:a14="http://schemas.microsoft.com/office/drawing/2010/main" val="0"/>
@@ -10343,7 +10856,7 @@
           <p:nvPr/>
         </p:nvPicPr>
         <p:blipFill>
-          <a:blip r:embed="rId2">
+          <a:blip r:embed="rId3">
             <a:extLst>
               <a:ext uri="{28A0092B-C50C-407E-A947-70E740481C1C}">
                 <a14:useLocalDpi xmlns:a14="http://schemas.microsoft.com/office/drawing/2010/main" val="0"/>
@@ -10379,7 +10892,7 @@
           <p:nvPr/>
         </p:nvPicPr>
         <p:blipFill>
-          <a:blip r:embed="rId3">
+          <a:blip r:embed="rId4">
             <a:extLst>
               <a:ext uri="{28A0092B-C50C-407E-A947-70E740481C1C}">
                 <a14:useLocalDpi xmlns:a14="http://schemas.microsoft.com/office/drawing/2010/main" val="0"/>
@@ -10409,7 +10922,7 @@
           <p:nvPr/>
         </p:nvPicPr>
         <p:blipFill>
-          <a:blip r:embed="rId4">
+          <a:blip r:embed="rId5">
             <a:extLst>
               <a:ext uri="{28A0092B-C50C-407E-A947-70E740481C1C}">
                 <a14:useLocalDpi xmlns:a14="http://schemas.microsoft.com/office/drawing/2010/main" val="0"/>
@@ -10439,7 +10952,7 @@
           <p:nvPr/>
         </p:nvPicPr>
         <p:blipFill>
-          <a:blip r:embed="rId5">
+          <a:blip r:embed="rId6">
             <a:extLst>
               <a:ext uri="{28A0092B-C50C-407E-A947-70E740481C1C}">
                 <a14:useLocalDpi xmlns:a14="http://schemas.microsoft.com/office/drawing/2010/main" val="0"/>
@@ -10619,7 +11132,7 @@
           <p:nvPr/>
         </p:nvPicPr>
         <p:blipFill>
-          <a:blip r:embed="rId2">
+          <a:blip r:embed="rId3">
             <a:extLst>
               <a:ext uri="{28A0092B-C50C-407E-A947-70E740481C1C}">
                 <a14:useLocalDpi xmlns:a14="http://schemas.microsoft.com/office/drawing/2010/main" val="0"/>
@@ -10672,7 +11185,7 @@
           <p:nvPr/>
         </p:nvPicPr>
         <p:blipFill>
-          <a:blip r:embed="rId3">
+          <a:blip r:embed="rId4">
             <a:extLst>
               <a:ext uri="{28A0092B-C50C-407E-A947-70E740481C1C}">
                 <a14:useLocalDpi xmlns:a14="http://schemas.microsoft.com/office/drawing/2010/main" val="0"/>
@@ -10708,7 +11221,7 @@
           <p:nvPr/>
         </p:nvPicPr>
         <p:blipFill>
-          <a:blip r:embed="rId4">
+          <a:blip r:embed="rId5">
             <a:extLst>
               <a:ext uri="{28A0092B-C50C-407E-A947-70E740481C1C}">
                 <a14:useLocalDpi xmlns:a14="http://schemas.microsoft.com/office/drawing/2010/main" val="0"/>
@@ -10738,7 +11251,7 @@
           <p:nvPr/>
         </p:nvPicPr>
         <p:blipFill>
-          <a:blip r:embed="rId5">
+          <a:blip r:embed="rId6">
             <a:extLst>
               <a:ext uri="{28A0092B-C50C-407E-A947-70E740481C1C}">
                 <a14:useLocalDpi xmlns:a14="http://schemas.microsoft.com/office/drawing/2010/main" val="0"/>
@@ -10845,7 +11358,7 @@
           <p:nvPr/>
         </p:nvPicPr>
         <p:blipFill>
-          <a:blip r:embed="rId6">
+          <a:blip r:embed="rId7">
             <a:extLst>
               <a:ext uri="{28A0092B-C50C-407E-A947-70E740481C1C}">
                 <a14:useLocalDpi xmlns:a14="http://schemas.microsoft.com/office/drawing/2010/main" val="0"/>
@@ -11963,6 +12476,204 @@
                       </p:childTnLst>
                     </p:cTn>
                   </p:par>
+                  <p:par>
+                    <p:cTn id="7" fill="hold">
+                      <p:stCondLst>
+                        <p:cond delay="indefinite"/>
+                      </p:stCondLst>
+                      <p:childTnLst>
+                        <p:par>
+                          <p:cTn id="8" fill="hold">
+                            <p:stCondLst>
+                              <p:cond delay="0"/>
+                            </p:stCondLst>
+                            <p:childTnLst>
+                              <p:par>
+                                <p:cTn id="9" presetID="1" presetClass="entr" presetSubtype="0" fill="hold" nodeType="clickEffect">
+                                  <p:stCondLst>
+                                    <p:cond delay="0"/>
+                                  </p:stCondLst>
+                                  <p:childTnLst>
+                                    <p:set>
+                                      <p:cBhvr>
+                                        <p:cTn id="10" dur="1" fill="hold">
+                                          <p:stCondLst>
+                                            <p:cond delay="0"/>
+                                          </p:stCondLst>
+                                        </p:cTn>
+                                        <p:tgtEl>
+                                          <p:spTgt spid="4"/>
+                                        </p:tgtEl>
+                                        <p:attrNameLst>
+                                          <p:attrName>style.visibility</p:attrName>
+                                        </p:attrNameLst>
+                                      </p:cBhvr>
+                                      <p:to>
+                                        <p:strVal val="visible"/>
+                                      </p:to>
+                                    </p:set>
+                                  </p:childTnLst>
+                                </p:cTn>
+                              </p:par>
+                              <p:par>
+                                <p:cTn id="11" presetID="1" presetClass="entr" presetSubtype="0" fill="hold" nodeType="withEffect">
+                                  <p:stCondLst>
+                                    <p:cond delay="0"/>
+                                  </p:stCondLst>
+                                  <p:childTnLst>
+                                    <p:set>
+                                      <p:cBhvr>
+                                        <p:cTn id="12" dur="1" fill="hold">
+                                          <p:stCondLst>
+                                            <p:cond delay="0"/>
+                                          </p:stCondLst>
+                                        </p:cTn>
+                                        <p:tgtEl>
+                                          <p:spTgt spid="12"/>
+                                        </p:tgtEl>
+                                        <p:attrNameLst>
+                                          <p:attrName>style.visibility</p:attrName>
+                                        </p:attrNameLst>
+                                      </p:cBhvr>
+                                      <p:to>
+                                        <p:strVal val="visible"/>
+                                      </p:to>
+                                    </p:set>
+                                  </p:childTnLst>
+                                </p:cTn>
+                              </p:par>
+                              <p:par>
+                                <p:cTn id="13" presetID="1" presetClass="entr" presetSubtype="0" fill="hold" nodeType="withEffect">
+                                  <p:stCondLst>
+                                    <p:cond delay="0"/>
+                                  </p:stCondLst>
+                                  <p:childTnLst>
+                                    <p:set>
+                                      <p:cBhvr>
+                                        <p:cTn id="14" dur="1" fill="hold">
+                                          <p:stCondLst>
+                                            <p:cond delay="0"/>
+                                          </p:stCondLst>
+                                        </p:cTn>
+                                        <p:tgtEl>
+                                          <p:spTgt spid="21"/>
+                                        </p:tgtEl>
+                                        <p:attrNameLst>
+                                          <p:attrName>style.visibility</p:attrName>
+                                        </p:attrNameLst>
+                                      </p:cBhvr>
+                                      <p:to>
+                                        <p:strVal val="visible"/>
+                                      </p:to>
+                                    </p:set>
+                                  </p:childTnLst>
+                                </p:cTn>
+                              </p:par>
+                            </p:childTnLst>
+                          </p:cTn>
+                        </p:par>
+                      </p:childTnLst>
+                    </p:cTn>
+                  </p:par>
+                  <p:par>
+                    <p:cTn id="15" fill="hold">
+                      <p:stCondLst>
+                        <p:cond delay="indefinite"/>
+                      </p:stCondLst>
+                      <p:childTnLst>
+                        <p:par>
+                          <p:cTn id="16" fill="hold">
+                            <p:stCondLst>
+                              <p:cond delay="0"/>
+                            </p:stCondLst>
+                            <p:childTnLst>
+                              <p:par>
+                                <p:cTn id="17" presetID="1" presetClass="entr" presetSubtype="0" fill="hold" nodeType="clickEffect">
+                                  <p:stCondLst>
+                                    <p:cond delay="0"/>
+                                  </p:stCondLst>
+                                  <p:childTnLst>
+                                    <p:set>
+                                      <p:cBhvr>
+                                        <p:cTn id="18" dur="1" fill="hold">
+                                          <p:stCondLst>
+                                            <p:cond delay="0"/>
+                                          </p:stCondLst>
+                                        </p:cTn>
+                                        <p:tgtEl>
+                                          <p:spTgt spid="13"/>
+                                        </p:tgtEl>
+                                        <p:attrNameLst>
+                                          <p:attrName>style.visibility</p:attrName>
+                                        </p:attrNameLst>
+                                      </p:cBhvr>
+                                      <p:to>
+                                        <p:strVal val="visible"/>
+                                      </p:to>
+                                    </p:set>
+                                  </p:childTnLst>
+                                </p:cTn>
+                              </p:par>
+                              <p:par>
+                                <p:cTn id="19" presetID="1" presetClass="entr" presetSubtype="0" fill="hold" nodeType="withEffect">
+                                  <p:stCondLst>
+                                    <p:cond delay="0"/>
+                                  </p:stCondLst>
+                                  <p:childTnLst>
+                                    <p:set>
+                                      <p:cBhvr>
+                                        <p:cTn id="20" dur="1" fill="hold">
+                                          <p:stCondLst>
+                                            <p:cond delay="0"/>
+                                          </p:stCondLst>
+                                        </p:cTn>
+                                        <p:tgtEl>
+                                          <p:spTgt spid="24"/>
+                                        </p:tgtEl>
+                                        <p:attrNameLst>
+                                          <p:attrName>style.visibility</p:attrName>
+                                        </p:attrNameLst>
+                                      </p:cBhvr>
+                                      <p:to>
+                                        <p:strVal val="visible"/>
+                                      </p:to>
+                                    </p:set>
+                                  </p:childTnLst>
+                                </p:cTn>
+                              </p:par>
+                              <p:par>
+                                <p:cTn id="21" presetID="1" presetClass="entr" presetSubtype="0" fill="hold" nodeType="withEffect">
+                                  <p:stCondLst>
+                                    <p:cond delay="0"/>
+                                  </p:stCondLst>
+                                  <p:childTnLst>
+                                    <p:set>
+                                      <p:cBhvr>
+                                        <p:cTn id="22" dur="1" fill="hold">
+                                          <p:stCondLst>
+                                            <p:cond delay="0"/>
+                                          </p:stCondLst>
+                                        </p:cTn>
+                                        <p:tgtEl>
+                                          <p:spTgt spid="3"/>
+                                        </p:tgtEl>
+                                        <p:attrNameLst>
+                                          <p:attrName>style.visibility</p:attrName>
+                                        </p:attrNameLst>
+                                      </p:cBhvr>
+                                      <p:to>
+                                        <p:strVal val="visible"/>
+                                      </p:to>
+                                    </p:set>
+                                  </p:childTnLst>
+                                </p:cTn>
+                              </p:par>
+                            </p:childTnLst>
+                          </p:cTn>
+                        </p:par>
+                      </p:childTnLst>
+                    </p:cTn>
+                  </p:par>
                 </p:childTnLst>
               </p:cTn>
               <p:prevCondLst>
@@ -12074,8 +12785,13 @@
             </a:pPr>
             <a:r>
               <a:rPr lang="en-US" sz="2800" dirty="0"/>
-              <a:t> Point Queries: algorithm and bounds for the cash-register case</a:t>
-            </a:r>
+              <a:t> Point Queries: algorithm and bounds for </a:t>
+            </a:r>
+            <a:r>
+              <a:rPr lang="en-US" sz="2800" dirty="0" smtClean="0"/>
+              <a:t>the non-negative case</a:t>
+            </a:r>
+            <a:endParaRPr lang="en-US" sz="2800" dirty="0"/>
           </a:p>
           <a:p>
             <a:pPr>
@@ -12084,8 +12800,13 @@
             </a:pPr>
             <a:r>
               <a:rPr lang="en-US" sz="2800" dirty="0"/>
-              <a:t> Inner Product Queries: algorithm and bounds</a:t>
-            </a:r>
+              <a:t> Inner Product Queries: algorithm and </a:t>
+            </a:r>
+            <a:r>
+              <a:rPr lang="en-US" sz="2800" dirty="0" smtClean="0"/>
+              <a:t>bounds for the non-negative case</a:t>
+            </a:r>
+            <a:endParaRPr lang="en-US" sz="2800" dirty="0"/>
           </a:p>
           <a:p>
             <a:pPr>
@@ -12094,18 +12815,13 @@
             </a:pPr>
             <a:r>
               <a:rPr lang="en-US" sz="2800" dirty="0"/>
-              <a:t> Range Queries: algorithm and bounds</a:t>
-            </a:r>
-          </a:p>
-          <a:p>
-            <a:pPr>
-              <a:buFont typeface="Arial" charset="0"/>
-              <a:buChar char="•"/>
-            </a:pPr>
-            <a:r>
-              <a:rPr lang="en-US" sz="2800" dirty="0"/>
-              <a:t> Selected Application: Heavy-Hitters</a:t>
-            </a:r>
+              <a:t> Range Queries: algorithm and </a:t>
+            </a:r>
+            <a:r>
+              <a:rPr lang="en-US" sz="2800" dirty="0" smtClean="0"/>
+              <a:t>bounds for the non-negative case</a:t>
+            </a:r>
+            <a:endParaRPr lang="en-US" sz="2800" dirty="0"/>
           </a:p>
         </p:txBody>
       </p:sp>
@@ -13815,10 +14531,14 @@
             <a:r>
               <a:rPr lang="en-US" sz="2800" dirty="0">
                 <a:solidFill>
-                  <a:schemeClr val="tx1"/>
+                  <a:srgbClr val="0070C0"/>
                 </a:solidFill>
               </a:rPr>
-              <a:t> Count-Min Sketch construction and updates</a:t>
+              <a:t> </a:t>
+            </a:r>
+            <a:r>
+              <a:rPr lang="en-US" sz="2800" dirty="0"/>
+              <a:t>Introduction, Problem Statement, and Related Work</a:t>
             </a:r>
           </a:p>
           <a:p>
@@ -13827,12 +14547,8 @@
               <a:buChar char="•"/>
             </a:pPr>
             <a:r>
-              <a:rPr lang="en-US" sz="2800" dirty="0">
-                <a:solidFill>
-                  <a:schemeClr val="tx1"/>
-                </a:solidFill>
-              </a:rPr>
-              <a:t> Point Queries: algorithm and bounds for the cash-register case</a:t>
+              <a:rPr lang="en-US" sz="2800" dirty="0"/>
+              <a:t> Count-Min Sketch construction and updates</a:t>
             </a:r>
           </a:p>
           <a:p>
@@ -13841,12 +14557,8 @@
               <a:buChar char="•"/>
             </a:pPr>
             <a:r>
-              <a:rPr lang="en-US" sz="2800" dirty="0">
-                <a:solidFill>
-                  <a:srgbClr val="0070C0"/>
-                </a:solidFill>
-              </a:rPr>
-              <a:t> Inner Product Queries: algorithm and bounds</a:t>
+              <a:rPr lang="en-US" sz="2800" dirty="0"/>
+              <a:t> Point Queries: algorithm and bounds for the non-negative case</a:t>
             </a:r>
           </a:p>
           <a:p>
@@ -13855,12 +14567,16 @@
               <a:buChar char="•"/>
             </a:pPr>
             <a:r>
+              <a:rPr lang="en-US" sz="2800" dirty="0"/>
+              <a:t> </a:t>
+            </a:r>
+            <a:r>
               <a:rPr lang="en-US" sz="2800" dirty="0">
                 <a:solidFill>
-                  <a:schemeClr val="tx1"/>
+                  <a:srgbClr val="0070C0"/>
                 </a:solidFill>
               </a:rPr>
-              <a:t> Range Queries: algorithm and bounds</a:t>
+              <a:t>Inner Product Queries: algorithm and bounds for the non-negative case</a:t>
             </a:r>
           </a:p>
           <a:p>
@@ -13870,7 +14586,7 @@
             </a:pPr>
             <a:r>
               <a:rPr lang="en-US" sz="2800" dirty="0"/>
-              <a:t> Selected Application: Heavy-Hitters</a:t>
+              <a:t> Range Queries: algorithm and bounds for the non-negative case</a:t>
             </a:r>
           </a:p>
           <a:p>
@@ -15782,759 +16498,9 @@
   <p:timing>
     <p:tnLst>
       <p:par>
-        <p:cTn id="1" dur="indefinite" restart="never" nodeType="tmRoot">
-          <p:childTnLst>
-            <p:seq concurrent="1" nextAc="seek">
-              <p:cTn id="2" dur="indefinite" nodeType="mainSeq">
-                <p:childTnLst>
-                  <p:par>
-                    <p:cTn id="3" fill="hold">
-                      <p:stCondLst>
-                        <p:cond delay="indefinite"/>
-                      </p:stCondLst>
-                      <p:childTnLst>
-                        <p:par>
-                          <p:cTn id="4" fill="hold">
-                            <p:stCondLst>
-                              <p:cond delay="0"/>
-                            </p:stCondLst>
-                            <p:childTnLst>
-                              <p:par>
-                                <p:cTn id="5" presetID="1" presetClass="entr" presetSubtype="0" fill="hold" grpId="0" nodeType="clickEffect">
-                                  <p:stCondLst>
-                                    <p:cond delay="0"/>
-                                  </p:stCondLst>
-                                  <p:childTnLst>
-                                    <p:set>
-                                      <p:cBhvr>
-                                        <p:cTn id="6" dur="1" fill="hold">
-                                          <p:stCondLst>
-                                            <p:cond delay="0"/>
-                                          </p:stCondLst>
-                                        </p:cTn>
-                                        <p:tgtEl>
-                                          <p:spTgt spid="25"/>
-                                        </p:tgtEl>
-                                        <p:attrNameLst>
-                                          <p:attrName>style.visibility</p:attrName>
-                                        </p:attrNameLst>
-                                      </p:cBhvr>
-                                      <p:to>
-                                        <p:strVal val="visible"/>
-                                      </p:to>
-                                    </p:set>
-                                  </p:childTnLst>
-                                </p:cTn>
-                              </p:par>
-                              <p:par>
-                                <p:cTn id="7" presetID="1" presetClass="entr" presetSubtype="0" fill="hold" nodeType="withEffect">
-                                  <p:stCondLst>
-                                    <p:cond delay="0"/>
-                                  </p:stCondLst>
-                                  <p:childTnLst>
-                                    <p:set>
-                                      <p:cBhvr>
-                                        <p:cTn id="8" dur="1" fill="hold">
-                                          <p:stCondLst>
-                                            <p:cond delay="0"/>
-                                          </p:stCondLst>
-                                        </p:cTn>
-                                        <p:tgtEl>
-                                          <p:spTgt spid="24"/>
-                                        </p:tgtEl>
-                                        <p:attrNameLst>
-                                          <p:attrName>style.visibility</p:attrName>
-                                        </p:attrNameLst>
-                                      </p:cBhvr>
-                                      <p:to>
-                                        <p:strVal val="visible"/>
-                                      </p:to>
-                                    </p:set>
-                                  </p:childTnLst>
-                                </p:cTn>
-                              </p:par>
-                              <p:par>
-                                <p:cTn id="9" presetID="1" presetClass="entr" presetSubtype="0" fill="hold" grpId="0" nodeType="withEffect">
-                                  <p:stCondLst>
-                                    <p:cond delay="0"/>
-                                  </p:stCondLst>
-                                  <p:childTnLst>
-                                    <p:set>
-                                      <p:cBhvr>
-                                        <p:cTn id="10" dur="1" fill="hold">
-                                          <p:stCondLst>
-                                            <p:cond delay="0"/>
-                                          </p:stCondLst>
-                                        </p:cTn>
-                                        <p:tgtEl>
-                                          <p:spTgt spid="6"/>
-                                        </p:tgtEl>
-                                        <p:attrNameLst>
-                                          <p:attrName>style.visibility</p:attrName>
-                                        </p:attrNameLst>
-                                      </p:cBhvr>
-                                      <p:to>
-                                        <p:strVal val="visible"/>
-                                      </p:to>
-                                    </p:set>
-                                  </p:childTnLst>
-                                </p:cTn>
-                              </p:par>
-                            </p:childTnLst>
-                          </p:cTn>
-                        </p:par>
-                      </p:childTnLst>
-                    </p:cTn>
-                  </p:par>
-                  <p:par>
-                    <p:cTn id="11" fill="hold">
-                      <p:stCondLst>
-                        <p:cond delay="indefinite"/>
-                      </p:stCondLst>
-                      <p:childTnLst>
-                        <p:par>
-                          <p:cTn id="12" fill="hold">
-                            <p:stCondLst>
-                              <p:cond delay="0"/>
-                            </p:stCondLst>
-                            <p:childTnLst>
-                              <p:par>
-                                <p:cTn id="13" presetID="1" presetClass="exit" presetSubtype="0" fill="hold" grpId="1" nodeType="clickEffect">
-                                  <p:stCondLst>
-                                    <p:cond delay="0"/>
-                                  </p:stCondLst>
-                                  <p:childTnLst>
-                                    <p:set>
-                                      <p:cBhvr>
-                                        <p:cTn id="14" dur="1" fill="hold">
-                                          <p:stCondLst>
-                                            <p:cond delay="0"/>
-                                          </p:stCondLst>
-                                        </p:cTn>
-                                        <p:tgtEl>
-                                          <p:spTgt spid="25"/>
-                                        </p:tgtEl>
-                                        <p:attrNameLst>
-                                          <p:attrName>style.visibility</p:attrName>
-                                        </p:attrNameLst>
-                                      </p:cBhvr>
-                                      <p:to>
-                                        <p:strVal val="hidden"/>
-                                      </p:to>
-                                    </p:set>
-                                  </p:childTnLst>
-                                </p:cTn>
-                              </p:par>
-                              <p:par>
-                                <p:cTn id="15" presetID="1" presetClass="exit" presetSubtype="0" fill="hold" nodeType="withEffect">
-                                  <p:stCondLst>
-                                    <p:cond delay="0"/>
-                                  </p:stCondLst>
-                                  <p:childTnLst>
-                                    <p:set>
-                                      <p:cBhvr>
-                                        <p:cTn id="16" dur="1" fill="hold">
-                                          <p:stCondLst>
-                                            <p:cond delay="0"/>
-                                          </p:stCondLst>
-                                        </p:cTn>
-                                        <p:tgtEl>
-                                          <p:spTgt spid="24"/>
-                                        </p:tgtEl>
-                                        <p:attrNameLst>
-                                          <p:attrName>style.visibility</p:attrName>
-                                        </p:attrNameLst>
-                                      </p:cBhvr>
-                                      <p:to>
-                                        <p:strVal val="hidden"/>
-                                      </p:to>
-                                    </p:set>
-                                  </p:childTnLst>
-                                </p:cTn>
-                              </p:par>
-                              <p:par>
-                                <p:cTn id="17" presetID="1" presetClass="entr" presetSubtype="0" fill="hold" grpId="0" nodeType="withEffect">
-                                  <p:stCondLst>
-                                    <p:cond delay="0"/>
-                                  </p:stCondLst>
-                                  <p:childTnLst>
-                                    <p:set>
-                                      <p:cBhvr>
-                                        <p:cTn id="18" dur="1" fill="hold">
-                                          <p:stCondLst>
-                                            <p:cond delay="0"/>
-                                          </p:stCondLst>
-                                        </p:cTn>
-                                        <p:tgtEl>
-                                          <p:spTgt spid="26"/>
-                                        </p:tgtEl>
-                                        <p:attrNameLst>
-                                          <p:attrName>style.visibility</p:attrName>
-                                        </p:attrNameLst>
-                                      </p:cBhvr>
-                                      <p:to>
-                                        <p:strVal val="visible"/>
-                                      </p:to>
-                                    </p:set>
-                                  </p:childTnLst>
-                                </p:cTn>
-                              </p:par>
-                              <p:par>
-                                <p:cTn id="19" presetID="1" presetClass="entr" presetSubtype="0" fill="hold" nodeType="withEffect">
-                                  <p:stCondLst>
-                                    <p:cond delay="0"/>
-                                  </p:stCondLst>
-                                  <p:childTnLst>
-                                    <p:set>
-                                      <p:cBhvr>
-                                        <p:cTn id="20" dur="1" fill="hold">
-                                          <p:stCondLst>
-                                            <p:cond delay="0"/>
-                                          </p:stCondLst>
-                                        </p:cTn>
-                                        <p:tgtEl>
-                                          <p:spTgt spid="35"/>
-                                        </p:tgtEl>
-                                        <p:attrNameLst>
-                                          <p:attrName>style.visibility</p:attrName>
-                                        </p:attrNameLst>
-                                      </p:cBhvr>
-                                      <p:to>
-                                        <p:strVal val="visible"/>
-                                      </p:to>
-                                    </p:set>
-                                  </p:childTnLst>
-                                </p:cTn>
-                              </p:par>
-                              <p:par>
-                                <p:cTn id="21" presetID="1" presetClass="entr" presetSubtype="0" fill="hold" grpId="0" nodeType="withEffect">
-                                  <p:stCondLst>
-                                    <p:cond delay="0"/>
-                                  </p:stCondLst>
-                                  <p:childTnLst>
-                                    <p:set>
-                                      <p:cBhvr>
-                                        <p:cTn id="22" dur="1" fill="hold">
-                                          <p:stCondLst>
-                                            <p:cond delay="0"/>
-                                          </p:stCondLst>
-                                        </p:cTn>
-                                        <p:tgtEl>
-                                          <p:spTgt spid="30"/>
-                                        </p:tgtEl>
-                                        <p:attrNameLst>
-                                          <p:attrName>style.visibility</p:attrName>
-                                        </p:attrNameLst>
-                                      </p:cBhvr>
-                                      <p:to>
-                                        <p:strVal val="visible"/>
-                                      </p:to>
-                                    </p:set>
-                                  </p:childTnLst>
-                                </p:cTn>
-                              </p:par>
-                            </p:childTnLst>
-                          </p:cTn>
-                        </p:par>
-                      </p:childTnLst>
-                    </p:cTn>
-                  </p:par>
-                  <p:par>
-                    <p:cTn id="23" fill="hold">
-                      <p:stCondLst>
-                        <p:cond delay="indefinite"/>
-                      </p:stCondLst>
-                      <p:childTnLst>
-                        <p:par>
-                          <p:cTn id="24" fill="hold">
-                            <p:stCondLst>
-                              <p:cond delay="0"/>
-                            </p:stCondLst>
-                            <p:childTnLst>
-                              <p:par>
-                                <p:cTn id="25" presetID="1" presetClass="exit" presetSubtype="0" fill="hold" grpId="1" nodeType="clickEffect">
-                                  <p:stCondLst>
-                                    <p:cond delay="0"/>
-                                  </p:stCondLst>
-                                  <p:childTnLst>
-                                    <p:set>
-                                      <p:cBhvr>
-                                        <p:cTn id="26" dur="1" fill="hold">
-                                          <p:stCondLst>
-                                            <p:cond delay="0"/>
-                                          </p:stCondLst>
-                                        </p:cTn>
-                                        <p:tgtEl>
-                                          <p:spTgt spid="26"/>
-                                        </p:tgtEl>
-                                        <p:attrNameLst>
-                                          <p:attrName>style.visibility</p:attrName>
-                                        </p:attrNameLst>
-                                      </p:cBhvr>
-                                      <p:to>
-                                        <p:strVal val="hidden"/>
-                                      </p:to>
-                                    </p:set>
-                                  </p:childTnLst>
-                                </p:cTn>
-                              </p:par>
-                              <p:par>
-                                <p:cTn id="27" presetID="1" presetClass="exit" presetSubtype="0" fill="hold" nodeType="withEffect">
-                                  <p:stCondLst>
-                                    <p:cond delay="0"/>
-                                  </p:stCondLst>
-                                  <p:childTnLst>
-                                    <p:set>
-                                      <p:cBhvr>
-                                        <p:cTn id="28" dur="1" fill="hold">
-                                          <p:stCondLst>
-                                            <p:cond delay="0"/>
-                                          </p:stCondLst>
-                                        </p:cTn>
-                                        <p:tgtEl>
-                                          <p:spTgt spid="35"/>
-                                        </p:tgtEl>
-                                        <p:attrNameLst>
-                                          <p:attrName>style.visibility</p:attrName>
-                                        </p:attrNameLst>
-                                      </p:cBhvr>
-                                      <p:to>
-                                        <p:strVal val="hidden"/>
-                                      </p:to>
-                                    </p:set>
-                                  </p:childTnLst>
-                                </p:cTn>
-                              </p:par>
-                              <p:par>
-                                <p:cTn id="29" presetID="1" presetClass="entr" presetSubtype="0" fill="hold" grpId="0" nodeType="withEffect">
-                                  <p:stCondLst>
-                                    <p:cond delay="0"/>
-                                  </p:stCondLst>
-                                  <p:childTnLst>
-                                    <p:set>
-                                      <p:cBhvr>
-                                        <p:cTn id="30" dur="1" fill="hold">
-                                          <p:stCondLst>
-                                            <p:cond delay="0"/>
-                                          </p:stCondLst>
-                                        </p:cTn>
-                                        <p:tgtEl>
-                                          <p:spTgt spid="27"/>
-                                        </p:tgtEl>
-                                        <p:attrNameLst>
-                                          <p:attrName>style.visibility</p:attrName>
-                                        </p:attrNameLst>
-                                      </p:cBhvr>
-                                      <p:to>
-                                        <p:strVal val="visible"/>
-                                      </p:to>
-                                    </p:set>
-                                  </p:childTnLst>
-                                </p:cTn>
-                              </p:par>
-                              <p:par>
-                                <p:cTn id="31" presetID="1" presetClass="entr" presetSubtype="0" fill="hold" nodeType="withEffect">
-                                  <p:stCondLst>
-                                    <p:cond delay="0"/>
-                                  </p:stCondLst>
-                                  <p:childTnLst>
-                                    <p:set>
-                                      <p:cBhvr>
-                                        <p:cTn id="32" dur="1" fill="hold">
-                                          <p:stCondLst>
-                                            <p:cond delay="0"/>
-                                          </p:stCondLst>
-                                        </p:cTn>
-                                        <p:tgtEl>
-                                          <p:spTgt spid="34"/>
-                                        </p:tgtEl>
-                                        <p:attrNameLst>
-                                          <p:attrName>style.visibility</p:attrName>
-                                        </p:attrNameLst>
-                                      </p:cBhvr>
-                                      <p:to>
-                                        <p:strVal val="visible"/>
-                                      </p:to>
-                                    </p:set>
-                                  </p:childTnLst>
-                                </p:cTn>
-                              </p:par>
-                              <p:par>
-                                <p:cTn id="33" presetID="1" presetClass="entr" presetSubtype="0" fill="hold" grpId="0" nodeType="withEffect">
-                                  <p:stCondLst>
-                                    <p:cond delay="0"/>
-                                  </p:stCondLst>
-                                  <p:childTnLst>
-                                    <p:set>
-                                      <p:cBhvr>
-                                        <p:cTn id="34" dur="1" fill="hold">
-                                          <p:stCondLst>
-                                            <p:cond delay="0"/>
-                                          </p:stCondLst>
-                                        </p:cTn>
-                                        <p:tgtEl>
-                                          <p:spTgt spid="31"/>
-                                        </p:tgtEl>
-                                        <p:attrNameLst>
-                                          <p:attrName>style.visibility</p:attrName>
-                                        </p:attrNameLst>
-                                      </p:cBhvr>
-                                      <p:to>
-                                        <p:strVal val="visible"/>
-                                      </p:to>
-                                    </p:set>
-                                  </p:childTnLst>
-                                </p:cTn>
-                              </p:par>
-                            </p:childTnLst>
-                          </p:cTn>
-                        </p:par>
-                      </p:childTnLst>
-                    </p:cTn>
-                  </p:par>
-                  <p:par>
-                    <p:cTn id="35" fill="hold">
-                      <p:stCondLst>
-                        <p:cond delay="indefinite"/>
-                      </p:stCondLst>
-                      <p:childTnLst>
-                        <p:par>
-                          <p:cTn id="36" fill="hold">
-                            <p:stCondLst>
-                              <p:cond delay="0"/>
-                            </p:stCondLst>
-                            <p:childTnLst>
-                              <p:par>
-                                <p:cTn id="37" presetID="1" presetClass="exit" presetSubtype="0" fill="hold" grpId="1" nodeType="clickEffect">
-                                  <p:stCondLst>
-                                    <p:cond delay="0"/>
-                                  </p:stCondLst>
-                                  <p:childTnLst>
-                                    <p:set>
-                                      <p:cBhvr>
-                                        <p:cTn id="38" dur="1" fill="hold">
-                                          <p:stCondLst>
-                                            <p:cond delay="0"/>
-                                          </p:stCondLst>
-                                        </p:cTn>
-                                        <p:tgtEl>
-                                          <p:spTgt spid="27"/>
-                                        </p:tgtEl>
-                                        <p:attrNameLst>
-                                          <p:attrName>style.visibility</p:attrName>
-                                        </p:attrNameLst>
-                                      </p:cBhvr>
-                                      <p:to>
-                                        <p:strVal val="hidden"/>
-                                      </p:to>
-                                    </p:set>
-                                  </p:childTnLst>
-                                </p:cTn>
-                              </p:par>
-                              <p:par>
-                                <p:cTn id="39" presetID="1" presetClass="exit" presetSubtype="0" fill="hold" nodeType="withEffect">
-                                  <p:stCondLst>
-                                    <p:cond delay="0"/>
-                                  </p:stCondLst>
-                                  <p:childTnLst>
-                                    <p:set>
-                                      <p:cBhvr>
-                                        <p:cTn id="40" dur="1" fill="hold">
-                                          <p:stCondLst>
-                                            <p:cond delay="0"/>
-                                          </p:stCondLst>
-                                        </p:cTn>
-                                        <p:tgtEl>
-                                          <p:spTgt spid="34"/>
-                                        </p:tgtEl>
-                                        <p:attrNameLst>
-                                          <p:attrName>style.visibility</p:attrName>
-                                        </p:attrNameLst>
-                                      </p:cBhvr>
-                                      <p:to>
-                                        <p:strVal val="hidden"/>
-                                      </p:to>
-                                    </p:set>
-                                  </p:childTnLst>
-                                </p:cTn>
-                              </p:par>
-                              <p:par>
-                                <p:cTn id="41" presetID="1" presetClass="entr" presetSubtype="0" fill="hold" grpId="0" nodeType="withEffect">
-                                  <p:stCondLst>
-                                    <p:cond delay="0"/>
-                                  </p:stCondLst>
-                                  <p:childTnLst>
-                                    <p:set>
-                                      <p:cBhvr>
-                                        <p:cTn id="42" dur="1" fill="hold">
-                                          <p:stCondLst>
-                                            <p:cond delay="0"/>
-                                          </p:stCondLst>
-                                        </p:cTn>
-                                        <p:tgtEl>
-                                          <p:spTgt spid="28"/>
-                                        </p:tgtEl>
-                                        <p:attrNameLst>
-                                          <p:attrName>style.visibility</p:attrName>
-                                        </p:attrNameLst>
-                                      </p:cBhvr>
-                                      <p:to>
-                                        <p:strVal val="visible"/>
-                                      </p:to>
-                                    </p:set>
-                                  </p:childTnLst>
-                                </p:cTn>
-                              </p:par>
-                              <p:par>
-                                <p:cTn id="43" presetID="1" presetClass="entr" presetSubtype="0" fill="hold" nodeType="withEffect">
-                                  <p:stCondLst>
-                                    <p:cond delay="0"/>
-                                  </p:stCondLst>
-                                  <p:childTnLst>
-                                    <p:set>
-                                      <p:cBhvr>
-                                        <p:cTn id="44" dur="1" fill="hold">
-                                          <p:stCondLst>
-                                            <p:cond delay="0"/>
-                                          </p:stCondLst>
-                                        </p:cTn>
-                                        <p:tgtEl>
-                                          <p:spTgt spid="36"/>
-                                        </p:tgtEl>
-                                        <p:attrNameLst>
-                                          <p:attrName>style.visibility</p:attrName>
-                                        </p:attrNameLst>
-                                      </p:cBhvr>
-                                      <p:to>
-                                        <p:strVal val="visible"/>
-                                      </p:to>
-                                    </p:set>
-                                  </p:childTnLst>
-                                </p:cTn>
-                              </p:par>
-                              <p:par>
-                                <p:cTn id="45" presetID="1" presetClass="entr" presetSubtype="0" fill="hold" grpId="0" nodeType="withEffect">
-                                  <p:stCondLst>
-                                    <p:cond delay="0"/>
-                                  </p:stCondLst>
-                                  <p:childTnLst>
-                                    <p:set>
-                                      <p:cBhvr>
-                                        <p:cTn id="46" dur="1" fill="hold">
-                                          <p:stCondLst>
-                                            <p:cond delay="0"/>
-                                          </p:stCondLst>
-                                        </p:cTn>
-                                        <p:tgtEl>
-                                          <p:spTgt spid="32"/>
-                                        </p:tgtEl>
-                                        <p:attrNameLst>
-                                          <p:attrName>style.visibility</p:attrName>
-                                        </p:attrNameLst>
-                                      </p:cBhvr>
-                                      <p:to>
-                                        <p:strVal val="visible"/>
-                                      </p:to>
-                                    </p:set>
-                                  </p:childTnLst>
-                                </p:cTn>
-                              </p:par>
-                            </p:childTnLst>
-                          </p:cTn>
-                        </p:par>
-                      </p:childTnLst>
-                    </p:cTn>
-                  </p:par>
-                  <p:par>
-                    <p:cTn id="47" fill="hold">
-                      <p:stCondLst>
-                        <p:cond delay="indefinite"/>
-                      </p:stCondLst>
-                      <p:childTnLst>
-                        <p:par>
-                          <p:cTn id="48" fill="hold">
-                            <p:stCondLst>
-                              <p:cond delay="0"/>
-                            </p:stCondLst>
-                            <p:childTnLst>
-                              <p:par>
-                                <p:cTn id="49" presetID="1" presetClass="exit" presetSubtype="0" fill="hold" grpId="1" nodeType="clickEffect">
-                                  <p:stCondLst>
-                                    <p:cond delay="0"/>
-                                  </p:stCondLst>
-                                  <p:childTnLst>
-                                    <p:set>
-                                      <p:cBhvr>
-                                        <p:cTn id="50" dur="1" fill="hold">
-                                          <p:stCondLst>
-                                            <p:cond delay="0"/>
-                                          </p:stCondLst>
-                                        </p:cTn>
-                                        <p:tgtEl>
-                                          <p:spTgt spid="28"/>
-                                        </p:tgtEl>
-                                        <p:attrNameLst>
-                                          <p:attrName>style.visibility</p:attrName>
-                                        </p:attrNameLst>
-                                      </p:cBhvr>
-                                      <p:to>
-                                        <p:strVal val="hidden"/>
-                                      </p:to>
-                                    </p:set>
-                                  </p:childTnLst>
-                                </p:cTn>
-                              </p:par>
-                              <p:par>
-                                <p:cTn id="51" presetID="1" presetClass="exit" presetSubtype="0" fill="hold" nodeType="withEffect">
-                                  <p:stCondLst>
-                                    <p:cond delay="0"/>
-                                  </p:stCondLst>
-                                  <p:childTnLst>
-                                    <p:set>
-                                      <p:cBhvr>
-                                        <p:cTn id="52" dur="1" fill="hold">
-                                          <p:stCondLst>
-                                            <p:cond delay="0"/>
-                                          </p:stCondLst>
-                                        </p:cTn>
-                                        <p:tgtEl>
-                                          <p:spTgt spid="36"/>
-                                        </p:tgtEl>
-                                        <p:attrNameLst>
-                                          <p:attrName>style.visibility</p:attrName>
-                                        </p:attrNameLst>
-                                      </p:cBhvr>
-                                      <p:to>
-                                        <p:strVal val="hidden"/>
-                                      </p:to>
-                                    </p:set>
-                                  </p:childTnLst>
-                                </p:cTn>
-                              </p:par>
-                              <p:par>
-                                <p:cTn id="53" presetID="1" presetClass="entr" presetSubtype="0" fill="hold" grpId="0" nodeType="withEffect">
-                                  <p:stCondLst>
-                                    <p:cond delay="0"/>
-                                  </p:stCondLst>
-                                  <p:childTnLst>
-                                    <p:set>
-                                      <p:cBhvr>
-                                        <p:cTn id="54" dur="1" fill="hold">
-                                          <p:stCondLst>
-                                            <p:cond delay="0"/>
-                                          </p:stCondLst>
-                                        </p:cTn>
-                                        <p:tgtEl>
-                                          <p:spTgt spid="29"/>
-                                        </p:tgtEl>
-                                        <p:attrNameLst>
-                                          <p:attrName>style.visibility</p:attrName>
-                                        </p:attrNameLst>
-                                      </p:cBhvr>
-                                      <p:to>
-                                        <p:strVal val="visible"/>
-                                      </p:to>
-                                    </p:set>
-                                  </p:childTnLst>
-                                </p:cTn>
-                              </p:par>
-                              <p:par>
-                                <p:cTn id="55" presetID="1" presetClass="entr" presetSubtype="0" fill="hold" nodeType="withEffect">
-                                  <p:stCondLst>
-                                    <p:cond delay="0"/>
-                                  </p:stCondLst>
-                                  <p:childTnLst>
-                                    <p:set>
-                                      <p:cBhvr>
-                                        <p:cTn id="56" dur="1" fill="hold">
-                                          <p:stCondLst>
-                                            <p:cond delay="0"/>
-                                          </p:stCondLst>
-                                        </p:cTn>
-                                        <p:tgtEl>
-                                          <p:spTgt spid="37"/>
-                                        </p:tgtEl>
-                                        <p:attrNameLst>
-                                          <p:attrName>style.visibility</p:attrName>
-                                        </p:attrNameLst>
-                                      </p:cBhvr>
-                                      <p:to>
-                                        <p:strVal val="visible"/>
-                                      </p:to>
-                                    </p:set>
-                                  </p:childTnLst>
-                                </p:cTn>
-                              </p:par>
-                              <p:par>
-                                <p:cTn id="57" presetID="1" presetClass="entr" presetSubtype="0" fill="hold" grpId="0" nodeType="withEffect">
-                                  <p:stCondLst>
-                                    <p:cond delay="0"/>
-                                  </p:stCondLst>
-                                  <p:childTnLst>
-                                    <p:set>
-                                      <p:cBhvr>
-                                        <p:cTn id="58" dur="1" fill="hold">
-                                          <p:stCondLst>
-                                            <p:cond delay="0"/>
-                                          </p:stCondLst>
-                                        </p:cTn>
-                                        <p:tgtEl>
-                                          <p:spTgt spid="33"/>
-                                        </p:tgtEl>
-                                        <p:attrNameLst>
-                                          <p:attrName>style.visibility</p:attrName>
-                                        </p:attrNameLst>
-                                      </p:cBhvr>
-                                      <p:to>
-                                        <p:strVal val="visible"/>
-                                      </p:to>
-                                    </p:set>
-                                  </p:childTnLst>
-                                </p:cTn>
-                              </p:par>
-                            </p:childTnLst>
-                          </p:cTn>
-                        </p:par>
-                      </p:childTnLst>
-                    </p:cTn>
-                  </p:par>
-                </p:childTnLst>
-              </p:cTn>
-              <p:prevCondLst>
-                <p:cond evt="onPrev" delay="0">
-                  <p:tgtEl>
-                    <p:sldTgt/>
-                  </p:tgtEl>
-                </p:cond>
-              </p:prevCondLst>
-              <p:nextCondLst>
-                <p:cond evt="onNext" delay="0">
-                  <p:tgtEl>
-                    <p:sldTgt/>
-                  </p:tgtEl>
-                </p:cond>
-              </p:nextCondLst>
-            </p:seq>
-          </p:childTnLst>
-        </p:cTn>
+        <p:cTn id="1" dur="indefinite" restart="never" nodeType="tmRoot"/>
       </p:par>
     </p:tnLst>
-    <p:bldLst>
-      <p:bldP spid="6" grpId="0" animBg="1"/>
-      <p:bldP spid="25" grpId="0"/>
-      <p:bldP spid="25" grpId="1"/>
-      <p:bldP spid="26" grpId="0"/>
-      <p:bldP spid="26" grpId="1"/>
-      <p:bldP spid="27" grpId="0"/>
-      <p:bldP spid="27" grpId="1"/>
-      <p:bldP spid="28" grpId="0"/>
-      <p:bldP spid="28" grpId="1"/>
-      <p:bldP spid="29" grpId="0"/>
-      <p:bldP spid="30" grpId="0" animBg="1"/>
-      <p:bldP spid="31" grpId="0" animBg="1"/>
-      <p:bldP spid="32" grpId="0" animBg="1"/>
-      <p:bldP spid="33" grpId="0" animBg="1"/>
-    </p:bldLst>
   </p:timing>
 </p:sld>
 </file>
@@ -16929,7 +16895,219 @@
   <p:timing>
     <p:tnLst>
       <p:par>
-        <p:cTn id="1" dur="indefinite" restart="never" nodeType="tmRoot"/>
+        <p:cTn id="1" dur="indefinite" restart="never" nodeType="tmRoot">
+          <p:childTnLst>
+            <p:seq concurrent="1" nextAc="seek">
+              <p:cTn id="2" dur="indefinite" nodeType="mainSeq">
+                <p:childTnLst>
+                  <p:par>
+                    <p:cTn id="3" fill="hold">
+                      <p:stCondLst>
+                        <p:cond delay="indefinite"/>
+                      </p:stCondLst>
+                      <p:childTnLst>
+                        <p:par>
+                          <p:cTn id="4" fill="hold">
+                            <p:stCondLst>
+                              <p:cond delay="0"/>
+                            </p:stCondLst>
+                            <p:childTnLst>
+                              <p:par>
+                                <p:cTn id="5" presetID="1" presetClass="entr" presetSubtype="0" fill="hold" nodeType="clickEffect">
+                                  <p:stCondLst>
+                                    <p:cond delay="0"/>
+                                  </p:stCondLst>
+                                  <p:childTnLst>
+                                    <p:set>
+                                      <p:cBhvr>
+                                        <p:cTn id="6" dur="1" fill="hold">
+                                          <p:stCondLst>
+                                            <p:cond delay="0"/>
+                                          </p:stCondLst>
+                                        </p:cTn>
+                                        <p:tgtEl>
+                                          <p:spTgt spid="4"/>
+                                        </p:tgtEl>
+                                        <p:attrNameLst>
+                                          <p:attrName>style.visibility</p:attrName>
+                                        </p:attrNameLst>
+                                      </p:cBhvr>
+                                      <p:to>
+                                        <p:strVal val="visible"/>
+                                      </p:to>
+                                    </p:set>
+                                  </p:childTnLst>
+                                </p:cTn>
+                              </p:par>
+                              <p:par>
+                                <p:cTn id="7" presetID="1" presetClass="entr" presetSubtype="0" fill="hold" nodeType="withEffect">
+                                  <p:stCondLst>
+                                    <p:cond delay="0"/>
+                                  </p:stCondLst>
+                                  <p:childTnLst>
+                                    <p:set>
+                                      <p:cBhvr>
+                                        <p:cTn id="8" dur="1" fill="hold">
+                                          <p:stCondLst>
+                                            <p:cond delay="0"/>
+                                          </p:stCondLst>
+                                        </p:cTn>
+                                        <p:tgtEl>
+                                          <p:spTgt spid="10"/>
+                                        </p:tgtEl>
+                                        <p:attrNameLst>
+                                          <p:attrName>style.visibility</p:attrName>
+                                        </p:attrNameLst>
+                                      </p:cBhvr>
+                                      <p:to>
+                                        <p:strVal val="visible"/>
+                                      </p:to>
+                                    </p:set>
+                                  </p:childTnLst>
+                                </p:cTn>
+                              </p:par>
+                              <p:par>
+                                <p:cTn id="9" presetID="1" presetClass="entr" presetSubtype="0" fill="hold" nodeType="withEffect">
+                                  <p:stCondLst>
+                                    <p:cond delay="0"/>
+                                  </p:stCondLst>
+                                  <p:childTnLst>
+                                    <p:set>
+                                      <p:cBhvr>
+                                        <p:cTn id="10" dur="1" fill="hold">
+                                          <p:stCondLst>
+                                            <p:cond delay="0"/>
+                                          </p:stCondLst>
+                                        </p:cTn>
+                                        <p:tgtEl>
+                                          <p:spTgt spid="8"/>
+                                        </p:tgtEl>
+                                        <p:attrNameLst>
+                                          <p:attrName>style.visibility</p:attrName>
+                                        </p:attrNameLst>
+                                      </p:cBhvr>
+                                      <p:to>
+                                        <p:strVal val="visible"/>
+                                      </p:to>
+                                    </p:set>
+                                  </p:childTnLst>
+                                </p:cTn>
+                              </p:par>
+                            </p:childTnLst>
+                          </p:cTn>
+                        </p:par>
+                      </p:childTnLst>
+                    </p:cTn>
+                  </p:par>
+                  <p:par>
+                    <p:cTn id="11" fill="hold">
+                      <p:stCondLst>
+                        <p:cond delay="indefinite"/>
+                      </p:stCondLst>
+                      <p:childTnLst>
+                        <p:par>
+                          <p:cTn id="12" fill="hold">
+                            <p:stCondLst>
+                              <p:cond delay="0"/>
+                            </p:stCondLst>
+                            <p:childTnLst>
+                              <p:par>
+                                <p:cTn id="13" presetID="1" presetClass="entr" presetSubtype="0" fill="hold" nodeType="clickEffect">
+                                  <p:stCondLst>
+                                    <p:cond delay="0"/>
+                                  </p:stCondLst>
+                                  <p:childTnLst>
+                                    <p:set>
+                                      <p:cBhvr>
+                                        <p:cTn id="14" dur="1" fill="hold">
+                                          <p:stCondLst>
+                                            <p:cond delay="0"/>
+                                          </p:stCondLst>
+                                        </p:cTn>
+                                        <p:tgtEl>
+                                          <p:spTgt spid="5"/>
+                                        </p:tgtEl>
+                                        <p:attrNameLst>
+                                          <p:attrName>style.visibility</p:attrName>
+                                        </p:attrNameLst>
+                                      </p:cBhvr>
+                                      <p:to>
+                                        <p:strVal val="visible"/>
+                                      </p:to>
+                                    </p:set>
+                                  </p:childTnLst>
+                                </p:cTn>
+                              </p:par>
+                            </p:childTnLst>
+                          </p:cTn>
+                        </p:par>
+                      </p:childTnLst>
+                    </p:cTn>
+                  </p:par>
+                  <p:par>
+                    <p:cTn id="15" fill="hold">
+                      <p:stCondLst>
+                        <p:cond delay="indefinite"/>
+                      </p:stCondLst>
+                      <p:childTnLst>
+                        <p:par>
+                          <p:cTn id="16" fill="hold">
+                            <p:stCondLst>
+                              <p:cond delay="0"/>
+                            </p:stCondLst>
+                            <p:childTnLst>
+                              <p:par>
+                                <p:cTn id="17" presetID="1" presetClass="entr" presetSubtype="0" fill="hold" nodeType="clickEffect">
+                                  <p:stCondLst>
+                                    <p:cond delay="0"/>
+                                  </p:stCondLst>
+                                  <p:childTnLst>
+                                    <p:set>
+                                      <p:cBhvr>
+                                        <p:cTn id="18" dur="1" fill="hold">
+                                          <p:stCondLst>
+                                            <p:cond delay="0"/>
+                                          </p:stCondLst>
+                                        </p:cTn>
+                                        <p:tgtEl>
+                                          <p:spTgt spid="7"/>
+                                        </p:tgtEl>
+                                        <p:attrNameLst>
+                                          <p:attrName>style.visibility</p:attrName>
+                                        </p:attrNameLst>
+                                      </p:cBhvr>
+                                      <p:to>
+                                        <p:strVal val="visible"/>
+                                      </p:to>
+                                    </p:set>
+                                  </p:childTnLst>
+                                </p:cTn>
+                              </p:par>
+                            </p:childTnLst>
+                          </p:cTn>
+                        </p:par>
+                      </p:childTnLst>
+                    </p:cTn>
+                  </p:par>
+                </p:childTnLst>
+              </p:cTn>
+              <p:prevCondLst>
+                <p:cond evt="onPrev" delay="0">
+                  <p:tgtEl>
+                    <p:sldTgt/>
+                  </p:tgtEl>
+                </p:cond>
+              </p:prevCondLst>
+              <p:nextCondLst>
+                <p:cond evt="onNext" delay="0">
+                  <p:tgtEl>
+                    <p:sldTgt/>
+                  </p:tgtEl>
+                </p:cond>
+              </p:nextCondLst>
+            </p:seq>
+          </p:childTnLst>
+        </p:cTn>
       </p:par>
     </p:tnLst>
   </p:timing>
@@ -17094,9 +17272,152 @@
   <p:timing>
     <p:tnLst>
       <p:par>
-        <p:cTn id="1" dur="indefinite" restart="never" nodeType="tmRoot"/>
+        <p:cTn id="1" dur="indefinite" restart="never" nodeType="tmRoot">
+          <p:childTnLst>
+            <p:seq concurrent="1" nextAc="seek">
+              <p:cTn id="2" dur="indefinite" nodeType="mainSeq">
+                <p:childTnLst>
+                  <p:par>
+                    <p:cTn id="3" fill="hold">
+                      <p:stCondLst>
+                        <p:cond delay="indefinite"/>
+                      </p:stCondLst>
+                      <p:childTnLst>
+                        <p:par>
+                          <p:cTn id="4" fill="hold">
+                            <p:stCondLst>
+                              <p:cond delay="0"/>
+                            </p:stCondLst>
+                            <p:childTnLst>
+                              <p:par>
+                                <p:cTn id="5" presetID="1" presetClass="entr" presetSubtype="0" fill="hold" nodeType="clickEffect">
+                                  <p:stCondLst>
+                                    <p:cond delay="0"/>
+                                  </p:stCondLst>
+                                  <p:childTnLst>
+                                    <p:set>
+                                      <p:cBhvr>
+                                        <p:cTn id="6" dur="1" fill="hold">
+                                          <p:stCondLst>
+                                            <p:cond delay="0"/>
+                                          </p:stCondLst>
+                                        </p:cTn>
+                                        <p:tgtEl>
+                                          <p:spTgt spid="3"/>
+                                        </p:tgtEl>
+                                        <p:attrNameLst>
+                                          <p:attrName>style.visibility</p:attrName>
+                                        </p:attrNameLst>
+                                      </p:cBhvr>
+                                      <p:to>
+                                        <p:strVal val="visible"/>
+                                      </p:to>
+                                    </p:set>
+                                  </p:childTnLst>
+                                </p:cTn>
+                              </p:par>
+                            </p:childTnLst>
+                          </p:cTn>
+                        </p:par>
+                      </p:childTnLst>
+                    </p:cTn>
+                  </p:par>
+                  <p:par>
+                    <p:cTn id="7" fill="hold">
+                      <p:stCondLst>
+                        <p:cond delay="indefinite"/>
+                      </p:stCondLst>
+                      <p:childTnLst>
+                        <p:par>
+                          <p:cTn id="8" fill="hold">
+                            <p:stCondLst>
+                              <p:cond delay="0"/>
+                            </p:stCondLst>
+                            <p:childTnLst>
+                              <p:par>
+                                <p:cTn id="9" presetID="1" presetClass="entr" presetSubtype="0" fill="hold" grpId="0" nodeType="clickEffect">
+                                  <p:stCondLst>
+                                    <p:cond delay="0"/>
+                                  </p:stCondLst>
+                                  <p:childTnLst>
+                                    <p:set>
+                                      <p:cBhvr>
+                                        <p:cTn id="10" dur="1" fill="hold">
+                                          <p:stCondLst>
+                                            <p:cond delay="0"/>
+                                          </p:stCondLst>
+                                        </p:cTn>
+                                        <p:tgtEl>
+                                          <p:spTgt spid="8"/>
+                                        </p:tgtEl>
+                                        <p:attrNameLst>
+                                          <p:attrName>style.visibility</p:attrName>
+                                        </p:attrNameLst>
+                                      </p:cBhvr>
+                                      <p:to>
+                                        <p:strVal val="visible"/>
+                                      </p:to>
+                                    </p:set>
+                                  </p:childTnLst>
+                                </p:cTn>
+                              </p:par>
+                              <p:par>
+                                <p:cTn id="11" presetID="1" presetClass="entr" presetSubtype="0" fill="hold" nodeType="withEffect">
+                                  <p:stCondLst>
+                                    <p:cond delay="0"/>
+                                  </p:stCondLst>
+                                  <p:childTnLst>
+                                    <p:set>
+                                      <p:cBhvr>
+                                        <p:cTn id="12" dur="1" fill="hold">
+                                          <p:stCondLst>
+                                            <p:cond delay="0"/>
+                                          </p:stCondLst>
+                                        </p:cTn>
+                                        <p:tgtEl>
+                                          <p:spTgt spid="9"/>
+                                        </p:tgtEl>
+                                        <p:attrNameLst>
+                                          <p:attrName>style.visibility</p:attrName>
+                                        </p:attrNameLst>
+                                      </p:cBhvr>
+                                      <p:to>
+                                        <p:strVal val="visible"/>
+                                      </p:to>
+                                    </p:set>
+                                  </p:childTnLst>
+                                </p:cTn>
+                              </p:par>
+                            </p:childTnLst>
+                          </p:cTn>
+                        </p:par>
+                      </p:childTnLst>
+                    </p:cTn>
+                  </p:par>
+                </p:childTnLst>
+              </p:cTn>
+              <p:prevCondLst>
+                <p:cond evt="onPrev" delay="0">
+                  <p:tgtEl>
+                    <p:sldTgt/>
+                  </p:tgtEl>
+                </p:cond>
+              </p:prevCondLst>
+              <p:nextCondLst>
+                <p:cond evt="onNext" delay="0">
+                  <p:tgtEl>
+                    <p:sldTgt/>
+                  </p:tgtEl>
+                </p:cond>
+              </p:nextCondLst>
+            </p:seq>
+          </p:childTnLst>
+        </p:cTn>
       </p:par>
     </p:tnLst>
+    <p:bldLst>
+      <p:bldP spid="8" grpId="0"/>
+    </p:bldLst>
   </p:timing>
 </p:sld>
 </file>
@@ -17165,18 +17486,14 @@
             <a:r>
               <a:rPr lang="en-US" sz="2800" dirty="0">
                 <a:solidFill>
-                  <a:schemeClr val="tx1"/>
+                  <a:srgbClr val="0070C0"/>
                 </a:solidFill>
               </a:rPr>
               <a:t> </a:t>
             </a:r>
             <a:r>
-              <a:rPr lang="en-US" sz="2800" dirty="0" smtClean="0">
-                <a:solidFill>
-                  <a:schemeClr val="tx1"/>
-                </a:solidFill>
-              </a:rPr>
-              <a:t>Count-Min Sketch construction and updates</a:t>
+              <a:rPr lang="en-US" sz="2800" dirty="0"/>
+              <a:t>Introduction, Problem Statement, and Related Work</a:t>
             </a:r>
           </a:p>
           <a:p>
@@ -17185,20 +17502,8 @@
               <a:buChar char="•"/>
             </a:pPr>
             <a:r>
-              <a:rPr lang="en-US" sz="2800" dirty="0">
-                <a:solidFill>
-                  <a:schemeClr val="tx1"/>
-                </a:solidFill>
-              </a:rPr>
-              <a:t> </a:t>
-            </a:r>
-            <a:r>
-              <a:rPr lang="en-US" sz="2800" dirty="0" smtClean="0">
-                <a:solidFill>
-                  <a:schemeClr val="tx1"/>
-                </a:solidFill>
-              </a:rPr>
-              <a:t>Point Queries: algorithm and bounds for the cash-register case</a:t>
+              <a:rPr lang="en-US" sz="2800" dirty="0"/>
+              <a:t> Count-Min Sketch construction and updates</a:t>
             </a:r>
           </a:p>
           <a:p>
@@ -17208,13 +17513,8 @@
             </a:pPr>
             <a:r>
               <a:rPr lang="en-US" sz="2800" dirty="0"/>
-              <a:t> </a:t>
-            </a:r>
-            <a:r>
-              <a:rPr lang="en-US" sz="2800" dirty="0" smtClean="0"/>
-              <a:t>Inner Product Queries: algorithm and bounds</a:t>
-            </a:r>
-            <a:endParaRPr lang="en-US" sz="2800" dirty="0"/>
+              <a:t> Point Queries: algorithm and bounds for the non-negative case</a:t>
+            </a:r>
           </a:p>
           <a:p>
             <a:pPr>
@@ -17222,20 +17522,8 @@
               <a:buChar char="•"/>
             </a:pPr>
             <a:r>
-              <a:rPr lang="en-US" sz="2800" dirty="0">
-                <a:solidFill>
-                  <a:srgbClr val="0070C0"/>
-                </a:solidFill>
-              </a:rPr>
-              <a:t> </a:t>
-            </a:r>
-            <a:r>
-              <a:rPr lang="en-US" sz="2800" dirty="0" smtClean="0">
-                <a:solidFill>
-                  <a:srgbClr val="0070C0"/>
-                </a:solidFill>
-              </a:rPr>
-              <a:t>Range Queries: algorithm and bounds</a:t>
+              <a:rPr lang="en-US" sz="2800" dirty="0"/>
+              <a:t> Inner Product Queries: algorithm and bounds for the non-negative case</a:t>
             </a:r>
           </a:p>
           <a:p>
@@ -17244,13 +17532,18 @@
               <a:buChar char="•"/>
             </a:pPr>
             <a:r>
-              <a:rPr lang="en-US" sz="2800" dirty="0"/>
-              <a:t> </a:t>
-            </a:r>
-            <a:r>
-              <a:rPr lang="en-US" sz="2800" dirty="0" smtClean="0"/>
-              <a:t>Selected Application: Heavy-Hitters</a:t>
-            </a:r>
+              <a:rPr lang="en-US" sz="2800" dirty="0">
+                <a:solidFill>
+                  <a:srgbClr val="0070C0"/>
+                </a:solidFill>
+              </a:rPr>
+              <a:t> Range Queries: algorithm and bounds for the non-negative case</a:t>
+            </a:r>
+            <a:endParaRPr lang="en-US" sz="2800" dirty="0">
+              <a:solidFill>
+                <a:srgbClr val="0070C0"/>
+              </a:solidFill>
+            </a:endParaRPr>
           </a:p>
         </p:txBody>
       </p:sp>
@@ -17411,7 +17704,19 @@
             </a:pPr>
             <a:r>
               <a:rPr lang="en-US" sz="2800" dirty="0"/>
-              <a:t>We wish to represent this in sublinear space, while supporting 3 main queries.</a:t>
+              <a:t>We wish to represent this in </a:t>
+            </a:r>
+            <a:r>
+              <a:rPr lang="en-US" sz="2800" dirty="0" err="1" smtClean="0"/>
+              <a:t>polylogarithmic</a:t>
+            </a:r>
+            <a:r>
+              <a:rPr lang="en-US" sz="2800" dirty="0" smtClean="0"/>
+              <a:t> space</a:t>
+            </a:r>
+            <a:r>
+              <a:rPr lang="en-US" sz="2800" dirty="0"/>
+              <a:t>, while supporting 3 main queries.</a:t>
             </a:r>
           </a:p>
         </p:txBody>
@@ -17533,27 +17838,15 @@
             </a:r>
             <a:r>
               <a:rPr lang="en-US" sz="2800" dirty="0" smtClean="0"/>
-              <a:t>rror </a:t>
+              <a:t>rror with extra multiplicative </a:t>
             </a:r>
             <a:r>
               <a:rPr lang="en-US" sz="2800" dirty="0" smtClean="0"/>
-              <a:t>with extra multiplicative term </a:t>
-            </a:r>
-            <a:r>
-              <a:rPr lang="hr-HR" sz="2800" dirty="0"/>
-              <a:t>||[</a:t>
-            </a:r>
-            <a:r>
-              <a:rPr lang="hr-HR" sz="2800" dirty="0" err="1"/>
-              <a:t>l,r</a:t>
-            </a:r>
-            <a:r>
-              <a:rPr lang="hr-HR" sz="2800" dirty="0"/>
-              <a:t>]||</a:t>
-            </a:r>
-            <a:r>
-              <a:rPr lang="hr-HR" sz="2800" baseline="-25000" dirty="0" smtClean="0"/>
-              <a:t>1</a:t>
+              <a:t>term, (</a:t>
+            </a:r>
+            <a:r>
+              <a:rPr lang="hr-HR" sz="2800" smtClean="0"/>
+              <a:t>r – l)</a:t>
             </a:r>
             <a:endParaRPr lang="hr-HR" sz="2800" baseline="-25000" dirty="0" smtClean="0"/>
           </a:p>
@@ -44536,6 +44829,66 @@
 </p:sld>
 </file>
 
+<file path=ppt/slides/slide49.xml><?xml version="1.0" encoding="utf-8"?>
+<p:sld xmlns:a="http://schemas.openxmlformats.org/drawingml/2006/main" xmlns:r="http://schemas.openxmlformats.org/officeDocument/2006/relationships" xmlns:p="http://schemas.openxmlformats.org/presentationml/2006/main">
+  <p:cSld>
+    <p:spTree>
+      <p:nvGrpSpPr>
+        <p:cNvPr id="1" name=""/>
+        <p:cNvGrpSpPr/>
+        <p:nvPr/>
+      </p:nvGrpSpPr>
+      <p:grpSpPr>
+        <a:xfrm>
+          <a:off x="0" y="0"/>
+          <a:ext cx="0" cy="0"/>
+          <a:chOff x="0" y="0"/>
+          <a:chExt cx="0" cy="0"/>
+        </a:xfrm>
+      </p:grpSpPr>
+      <p:sp>
+        <p:nvSpPr>
+          <p:cNvPr id="2" name="Title 1"/>
+          <p:cNvSpPr>
+            <a:spLocks noGrp="1"/>
+          </p:cNvSpPr>
+          <p:nvPr>
+            <p:ph type="title"/>
+          </p:nvPr>
+        </p:nvSpPr>
+        <p:spPr/>
+        <p:txBody>
+          <a:bodyPr/>
+          <a:lstStyle/>
+          <a:p>
+            <a:r>
+              <a:rPr lang="en-US" dirty="0" smtClean="0"/>
+              <a:t>Questions?</a:t>
+            </a:r>
+            <a:endParaRPr lang="en-US" dirty="0"/>
+          </a:p>
+        </p:txBody>
+      </p:sp>
+    </p:spTree>
+    <p:extLst>
+      <p:ext uri="{BB962C8B-B14F-4D97-AF65-F5344CB8AC3E}">
+        <p14:creationId xmlns:p14="http://schemas.microsoft.com/office/powerpoint/2010/main" val="1179806363"/>
+      </p:ext>
+    </p:extLst>
+  </p:cSld>
+  <p:clrMapOvr>
+    <a:masterClrMapping/>
+  </p:clrMapOvr>
+  <p:timing>
+    <p:tnLst>
+      <p:par>
+        <p:cTn id="1" dur="indefinite" restart="never" nodeType="tmRoot"/>
+      </p:par>
+    </p:tnLst>
+  </p:timing>
+</p:sld>
+</file>
+
 <file path=ppt/slides/slide5.xml><?xml version="1.0" encoding="utf-8"?>
 <p:sld xmlns:a="http://schemas.openxmlformats.org/drawingml/2006/main" xmlns:r="http://schemas.openxmlformats.org/officeDocument/2006/relationships" xmlns:p="http://schemas.openxmlformats.org/presentationml/2006/main">
   <p:cSld>
@@ -44653,8 +45006,35 @@
             </a:r>
             <a:r>
               <a:rPr lang="en-US" sz="2800" dirty="0" smtClean="0"/>
-              <a:t>Requires p-wise independent hash functions (AMS Sketch)</a:t>
-            </a:r>
+              <a:t>Some r</a:t>
+            </a:r>
+            <a:r>
+              <a:rPr lang="en-US" sz="2800" dirty="0" smtClean="0"/>
+              <a:t>equire 4-wise </a:t>
+            </a:r>
+            <a:r>
+              <a:rPr lang="en-US" sz="2800" dirty="0" smtClean="0"/>
+              <a:t>independent hash functions (AMS Sketch</a:t>
+            </a:r>
+            <a:r>
+              <a:rPr lang="en-US" sz="2800" dirty="0" smtClean="0"/>
+              <a:t>)</a:t>
+            </a:r>
+          </a:p>
+          <a:p>
+            <a:pPr>
+              <a:buFont typeface="Arial" charset="0"/>
+              <a:buChar char="•"/>
+            </a:pPr>
+            <a:r>
+              <a:rPr lang="en-US" sz="2800" dirty="0"/>
+              <a:t> </a:t>
+            </a:r>
+            <a:r>
+              <a:rPr lang="en-US" sz="2800" dirty="0" smtClean="0"/>
+              <a:t>Some sketches have analysis that hide large constants (Count Sketch has a constant 256)</a:t>
+            </a:r>
+            <a:endParaRPr lang="en-US" sz="2800" dirty="0" smtClean="0"/>
           </a:p>
         </p:txBody>
       </p:sp>
@@ -44878,7 +45258,7 @@
       </p:sp>
       <p:sp>
         <p:nvSpPr>
-          <p:cNvPr id="3" name="Content Placeholder 2"/>
+          <p:cNvPr id="6" name="Content Placeholder 2"/>
           <p:cNvSpPr>
             <a:spLocks noGrp="1"/>
           </p:cNvSpPr>
@@ -44898,7 +45278,7 @@
               <a:buChar char="•"/>
             </a:pPr>
             <a:r>
-              <a:rPr lang="en-US" sz="2800" dirty="0" smtClean="0">
+              <a:rPr lang="en-US" sz="2800" dirty="0">
                 <a:solidFill>
                   <a:srgbClr val="0070C0"/>
                 </a:solidFill>
@@ -44906,7 +45286,7 @@
               <a:t> </a:t>
             </a:r>
             <a:r>
-              <a:rPr lang="en-US" sz="2800" dirty="0" smtClean="0"/>
+              <a:rPr lang="en-US" sz="2800" dirty="0"/>
               <a:t>Introduction, Problem Statement, and Related Work</a:t>
             </a:r>
           </a:p>
@@ -44921,15 +45301,7 @@
                   <a:srgbClr val="0070C0"/>
                 </a:solidFill>
               </a:rPr>
-              <a:t> </a:t>
-            </a:r>
-            <a:r>
-              <a:rPr lang="en-US" sz="2800" dirty="0" smtClean="0">
-                <a:solidFill>
-                  <a:srgbClr val="0070C0"/>
-                </a:solidFill>
-              </a:rPr>
-              <a:t>Count-Min Sketch construction and updates</a:t>
+              <a:t> Count-Min Sketch construction and updates</a:t>
             </a:r>
           </a:p>
           <a:p>
@@ -44939,25 +45311,11 @@
             </a:pPr>
             <a:r>
               <a:rPr lang="en-US" sz="2800" dirty="0"/>
-              <a:t> </a:t>
+              <a:t> Point Queries: algorithm and bounds for </a:t>
             </a:r>
             <a:r>
               <a:rPr lang="en-US" sz="2800" dirty="0" smtClean="0"/>
-              <a:t>Point Queries: algorithm and bounds for the cash-register case</a:t>
-            </a:r>
-          </a:p>
-          <a:p>
-            <a:pPr>
-              <a:buFont typeface="Arial" charset="0"/>
-              <a:buChar char="•"/>
-            </a:pPr>
-            <a:r>
-              <a:rPr lang="en-US" sz="2800" dirty="0"/>
-              <a:t> </a:t>
-            </a:r>
-            <a:r>
-              <a:rPr lang="en-US" sz="2800" dirty="0" smtClean="0"/>
-              <a:t>Inner Product Queries: algorithm and bounds</a:t>
+              <a:t>the non-negative case</a:t>
             </a:r>
             <a:endParaRPr lang="en-US" sz="2800" dirty="0"/>
           </a:p>
@@ -44968,12 +45326,13 @@
             </a:pPr>
             <a:r>
               <a:rPr lang="en-US" sz="2800" dirty="0"/>
-              <a:t> </a:t>
+              <a:t> Inner Product Queries: algorithm and </a:t>
             </a:r>
             <a:r>
               <a:rPr lang="en-US" sz="2800" dirty="0" smtClean="0"/>
-              <a:t>Range Queries: algorithm and bounds</a:t>
-            </a:r>
+              <a:t>bounds for the non-negative case</a:t>
+            </a:r>
+            <a:endParaRPr lang="en-US" sz="2800" dirty="0"/>
           </a:p>
           <a:p>
             <a:pPr>
@@ -44982,12 +45341,13 @@
             </a:pPr>
             <a:r>
               <a:rPr lang="en-US" sz="2800" dirty="0"/>
-              <a:t> </a:t>
+              <a:t> Range Queries: algorithm and </a:t>
             </a:r>
             <a:r>
               <a:rPr lang="en-US" sz="2800" dirty="0" smtClean="0"/>
-              <a:t>Selected Application: Heavy-Hitters</a:t>
-            </a:r>
+              <a:t>bounds for the non-negative case</a:t>
+            </a:r>
+            <a:endParaRPr lang="en-US" sz="2800" dirty="0"/>
           </a:p>
         </p:txBody>
       </p:sp>

</xml_diff>

<commit_message>
minor tweaks based on paper tweaks
</commit_message>
<xml_diff>
--- a/count_min_sketch_talk_EW.pptx
+++ b/count_min_sketch_talk_EW.pptx
@@ -245,7 +245,7 @@
           <a:p>
             <a:fld id="{58895B02-70E6-674C-BD1F-6A7F778A89D9}" type="datetimeFigureOut">
               <a:rPr lang="en-US" smtClean="0"/>
-              <a:t>12/14/16</a:t>
+              <a:t>12/15/16</a:t>
             </a:fld>
             <a:endParaRPr lang="en-US"/>
           </a:p>
@@ -1561,7 +1561,7 @@
           <a:p>
             <a:fld id="{C03047AA-ACB6-D34A-9274-C4E96F83774F}" type="datetimeFigureOut">
               <a:rPr lang="en-US" smtClean="0"/>
-              <a:t>12/14/16</a:t>
+              <a:t>12/15/16</a:t>
             </a:fld>
             <a:endParaRPr lang="en-US"/>
           </a:p>
@@ -1769,7 +1769,7 @@
           <a:p>
             <a:fld id="{C03047AA-ACB6-D34A-9274-C4E96F83774F}" type="datetimeFigureOut">
               <a:rPr lang="en-US" smtClean="0"/>
-              <a:t>12/14/16</a:t>
+              <a:t>12/15/16</a:t>
             </a:fld>
             <a:endParaRPr lang="en-US"/>
           </a:p>
@@ -2025,7 +2025,7 @@
           <a:p>
             <a:fld id="{C03047AA-ACB6-D34A-9274-C4E96F83774F}" type="datetimeFigureOut">
               <a:rPr lang="en-US" smtClean="0"/>
-              <a:t>12/14/16</a:t>
+              <a:t>12/15/16</a:t>
             </a:fld>
             <a:endParaRPr lang="en-US"/>
           </a:p>
@@ -2199,7 +2199,7 @@
           <a:p>
             <a:fld id="{C03047AA-ACB6-D34A-9274-C4E96F83774F}" type="datetimeFigureOut">
               <a:rPr lang="en-US" smtClean="0"/>
-              <a:t>12/14/16</a:t>
+              <a:t>12/15/16</a:t>
             </a:fld>
             <a:endParaRPr lang="en-US"/>
           </a:p>
@@ -2542,7 +2542,7 @@
           <a:p>
             <a:fld id="{C03047AA-ACB6-D34A-9274-C4E96F83774F}" type="datetimeFigureOut">
               <a:rPr lang="en-US" smtClean="0"/>
-              <a:t>12/14/16</a:t>
+              <a:t>12/15/16</a:t>
             </a:fld>
             <a:endParaRPr lang="en-US"/>
           </a:p>
@@ -2817,7 +2817,7 @@
           <a:p>
             <a:fld id="{C03047AA-ACB6-D34A-9274-C4E96F83774F}" type="datetimeFigureOut">
               <a:rPr lang="en-US" smtClean="0"/>
-              <a:t>12/14/16</a:t>
+              <a:t>12/15/16</a:t>
             </a:fld>
             <a:endParaRPr lang="en-US"/>
           </a:p>
@@ -3196,7 +3196,7 @@
           <a:p>
             <a:fld id="{C03047AA-ACB6-D34A-9274-C4E96F83774F}" type="datetimeFigureOut">
               <a:rPr lang="en-US" smtClean="0"/>
-              <a:t>12/14/16</a:t>
+              <a:t>12/15/16</a:t>
             </a:fld>
             <a:endParaRPr lang="en-US"/>
           </a:p>
@@ -3314,7 +3314,7 @@
           <a:p>
             <a:fld id="{C03047AA-ACB6-D34A-9274-C4E96F83774F}" type="datetimeFigureOut">
               <a:rPr lang="en-US" smtClean="0"/>
-              <a:t>12/14/16</a:t>
+              <a:t>12/15/16</a:t>
             </a:fld>
             <a:endParaRPr lang="en-US"/>
           </a:p>
@@ -3485,7 +3485,7 @@
           <a:p>
             <a:fld id="{C03047AA-ACB6-D34A-9274-C4E96F83774F}" type="datetimeFigureOut">
               <a:rPr lang="en-US" smtClean="0"/>
-              <a:t>12/14/16</a:t>
+              <a:t>12/15/16</a:t>
             </a:fld>
             <a:endParaRPr lang="en-US"/>
           </a:p>
@@ -3839,7 +3839,7 @@
           <a:p>
             <a:fld id="{C03047AA-ACB6-D34A-9274-C4E96F83774F}" type="datetimeFigureOut">
               <a:rPr lang="en-US" smtClean="0"/>
-              <a:t>12/14/16</a:t>
+              <a:t>12/15/16</a:t>
             </a:fld>
             <a:endParaRPr lang="en-US"/>
           </a:p>
@@ -4221,7 +4221,7 @@
           <a:p>
             <a:fld id="{C03047AA-ACB6-D34A-9274-C4E96F83774F}" type="datetimeFigureOut">
               <a:rPr lang="en-US" smtClean="0"/>
-              <a:t>12/14/16</a:t>
+              <a:t>12/15/16</a:t>
             </a:fld>
             <a:endParaRPr lang="en-US"/>
           </a:p>
@@ -4508,7 +4508,7 @@
           <a:p>
             <a:fld id="{C03047AA-ACB6-D34A-9274-C4E96F83774F}" type="datetimeFigureOut">
               <a:rPr lang="en-US" smtClean="0"/>
-              <a:t>12/14/16</a:t>
+              <a:t>12/15/16</a:t>
             </a:fld>
             <a:endParaRPr lang="en-US"/>
           </a:p>
@@ -5051,7 +5051,6 @@
               <a:rPr lang="en-US" dirty="0"/>
               <a:t>The Count-Min Sketch and Its Applications</a:t>
             </a:r>
-            <a:endParaRPr lang="en-US" dirty="0"/>
           </a:p>
         </p:txBody>
       </p:sp>
@@ -7792,7 +7791,6 @@
               <a:rPr lang="en-US" sz="2800" dirty="0"/>
               <a:t> Range Queries: algorithm and bounds for the non-negative case</a:t>
             </a:r>
-            <a:endParaRPr lang="en-US" sz="2800" dirty="0"/>
           </a:p>
         </p:txBody>
       </p:sp>
@@ -17539,11 +17537,6 @@
               </a:rPr>
               <a:t> Range Queries: algorithm and bounds for the non-negative case</a:t>
             </a:r>
-            <a:endParaRPr lang="en-US" sz="2800" dirty="0">
-              <a:solidFill>
-                <a:srgbClr val="0070C0"/>
-              </a:solidFill>
-            </a:endParaRPr>
           </a:p>
         </p:txBody>
       </p:sp>
@@ -17838,11 +17831,7 @@
             </a:r>
             <a:r>
               <a:rPr lang="en-US" sz="2800" dirty="0" smtClean="0"/>
-              <a:t>rror with extra multiplicative </a:t>
-            </a:r>
-            <a:r>
-              <a:rPr lang="en-US" sz="2800" dirty="0" smtClean="0"/>
-              <a:t>term, (</a:t>
+              <a:t>rror with extra multiplicative term, (</a:t>
             </a:r>
             <a:r>
               <a:rPr lang="hr-HR" sz="2800" smtClean="0"/>
@@ -33150,7 +33139,7 @@
       </p:sp>
       <p:pic>
         <p:nvPicPr>
-          <p:cNvPr id="6" name="Picture 5"/>
+          <p:cNvPr id="3" name="Picture 2"/>
           <p:cNvPicPr>
             <a:picLocks noChangeAspect="1"/>
           </p:cNvPicPr>
@@ -33170,8 +33159,8 @@
         </p:blipFill>
         <p:spPr>
           <a:xfrm>
-            <a:off x="1097280" y="2109788"/>
-            <a:ext cx="10604183" cy="2298809"/>
+            <a:off x="1097280" y="2009648"/>
+            <a:ext cx="10131552" cy="2218150"/>
           </a:xfrm>
           <a:prstGeom prst="rect">
             <a:avLst/>
@@ -44060,7 +44049,7 @@
       </p:pic>
       <p:pic>
         <p:nvPicPr>
-          <p:cNvPr id="5" name="Picture 4"/>
+          <p:cNvPr id="6" name="Picture 5"/>
           <p:cNvPicPr>
             <a:picLocks noChangeAspect="1"/>
           </p:cNvPicPr>
@@ -44068,36 +44057,6 @@
         </p:nvPicPr>
         <p:blipFill>
           <a:blip r:embed="rId3">
-            <a:extLst>
-              <a:ext uri="{28A0092B-C50C-407E-A947-70E740481C1C}">
-                <a14:useLocalDpi xmlns:a14="http://schemas.microsoft.com/office/drawing/2010/main" val="0"/>
-              </a:ext>
-            </a:extLst>
-          </a:blip>
-          <a:stretch>
-            <a:fillRect/>
-          </a:stretch>
-        </p:blipFill>
-        <p:spPr>
-          <a:xfrm>
-            <a:off x="1097280" y="3264784"/>
-            <a:ext cx="10281033" cy="929263"/>
-          </a:xfrm>
-          <a:prstGeom prst="rect">
-            <a:avLst/>
-          </a:prstGeom>
-        </p:spPr>
-      </p:pic>
-      <p:pic>
-        <p:nvPicPr>
-          <p:cNvPr id="6" name="Picture 5"/>
-          <p:cNvPicPr>
-            <a:picLocks noChangeAspect="1"/>
-          </p:cNvPicPr>
-          <p:nvPr/>
-        </p:nvPicPr>
-        <p:blipFill>
-          <a:blip r:embed="rId4">
             <a:extLst>
               <a:ext uri="{28A0092B-C50C-407E-A947-70E740481C1C}">
                 <a14:useLocalDpi xmlns:a14="http://schemas.microsoft.com/office/drawing/2010/main" val="0"/>
@@ -44127,7 +44086,7 @@
           <p:nvPr/>
         </p:nvPicPr>
         <p:blipFill>
-          <a:blip r:embed="rId5">
+          <a:blip r:embed="rId4">
             <a:extLst>
               <a:ext uri="{28A0092B-C50C-407E-A947-70E740481C1C}">
                 <a14:useLocalDpi xmlns:a14="http://schemas.microsoft.com/office/drawing/2010/main" val="0"/>
@@ -44142,6 +44101,36 @@
           <a:xfrm>
             <a:off x="3559112" y="5166069"/>
             <a:ext cx="2031354" cy="682668"/>
+          </a:xfrm>
+          <a:prstGeom prst="rect">
+            <a:avLst/>
+          </a:prstGeom>
+        </p:spPr>
+      </p:pic>
+      <p:pic>
+        <p:nvPicPr>
+          <p:cNvPr id="3" name="Picture 2"/>
+          <p:cNvPicPr>
+            <a:picLocks noChangeAspect="1"/>
+          </p:cNvPicPr>
+          <p:nvPr/>
+        </p:nvPicPr>
+        <p:blipFill>
+          <a:blip r:embed="rId5">
+            <a:extLst>
+              <a:ext uri="{28A0092B-C50C-407E-A947-70E740481C1C}">
+                <a14:useLocalDpi xmlns:a14="http://schemas.microsoft.com/office/drawing/2010/main" val="0"/>
+              </a:ext>
+            </a:extLst>
+          </a:blip>
+          <a:stretch>
+            <a:fillRect/>
+          </a:stretch>
+        </p:blipFill>
+        <p:spPr>
+          <a:xfrm>
+            <a:off x="1633432" y="3188250"/>
+            <a:ext cx="10485712" cy="796036"/>
           </a:xfrm>
           <a:prstGeom prst="rect">
             <a:avLst/>
@@ -44237,7 +44226,7 @@
                                           </p:stCondLst>
                                         </p:cTn>
                                         <p:tgtEl>
-                                          <p:spTgt spid="5"/>
+                                          <p:spTgt spid="3"/>
                                         </p:tgtEl>
                                         <p:attrNameLst>
                                           <p:attrName>style.visibility</p:attrName>
@@ -45006,19 +44995,7 @@
             </a:r>
             <a:r>
               <a:rPr lang="en-US" sz="2800" dirty="0" smtClean="0"/>
-              <a:t>Some r</a:t>
-            </a:r>
-            <a:r>
-              <a:rPr lang="en-US" sz="2800" dirty="0" smtClean="0"/>
-              <a:t>equire 4-wise </a:t>
-            </a:r>
-            <a:r>
-              <a:rPr lang="en-US" sz="2800" dirty="0" smtClean="0"/>
-              <a:t>independent hash functions (AMS Sketch</a:t>
-            </a:r>
-            <a:r>
-              <a:rPr lang="en-US" sz="2800" dirty="0" smtClean="0"/>
-              <a:t>)</a:t>
+              <a:t>Some require 4-wise independent hash functions (AMS Sketch)</a:t>
             </a:r>
           </a:p>
           <a:p>
@@ -45034,7 +45011,6 @@
               <a:rPr lang="en-US" sz="2800" dirty="0" smtClean="0"/>
               <a:t>Some sketches have analysis that hide large constants (Count Sketch has a constant 256)</a:t>
             </a:r>
-            <a:endParaRPr lang="en-US" sz="2800" dirty="0" smtClean="0"/>
           </a:p>
         </p:txBody>
       </p:sp>

</xml_diff>